<commit_message>
updates from mon 1/30
</commit_message>
<xml_diff>
--- a/ARO2023_HF_DPOAE_Poster.pptx
+++ b/ARO2023_HF_DPOAE_Poster.pptx
@@ -4393,8 +4393,8 @@
         </p:nvSpPr>
         <p:spPr bwMode="auto">
           <a:xfrm>
-            <a:off x="8229600" y="457200"/>
-            <a:ext cx="36576000" cy="4389120"/>
+            <a:off x="8229600" y="581962"/>
+            <a:ext cx="36576000" cy="4139595"/>
           </a:xfrm>
           <a:prstGeom prst="rect">
             <a:avLst/>
@@ -4421,7 +4421,7 @@
               <a:defRPr/>
             </a:pPr>
             <a:r>
-              <a:rPr lang="en-US" sz="8800" b="1" dirty="0">
+              <a:rPr lang="en-US" sz="8800" dirty="0">
                 <a:latin typeface="Franklin Gothic Demi" panose="020B0603020102020204" pitchFamily="34" charset="0"/>
               </a:rPr>
               <a:t>Relationship Between Distortion Product Otoacoustic Emissions and Audiometric Thresholds in the Extended High-Frequency Range</a:t>
@@ -4435,7 +4435,7 @@
               <a:rPr lang="en-US" sz="5700" u="sng" dirty="0">
                 <a:latin typeface="Franklin Gothic Medium" panose="020B0603020102020204" pitchFamily="34" charset="0"/>
               </a:rPr>
-              <a:t>Samantha Hauser, AuD</a:t>
+              <a:t>Samantha N. Hauser, AuD</a:t>
             </a:r>
             <a:r>
               <a:rPr lang="en-US" sz="5700" baseline="30000" dirty="0">
@@ -4447,7 +4447,7 @@
               <a:rPr lang="en-US" sz="5700" dirty="0">
                 <a:latin typeface="Franklin Gothic Medium" panose="020B0603020102020204" pitchFamily="34" charset="0"/>
               </a:rPr>
-              <a:t>, Anna Hagedorn BS</a:t>
+              <a:t>, Anna Hagedorn, BS</a:t>
             </a:r>
             <a:r>
               <a:rPr lang="en-US" sz="5700" baseline="30000" dirty="0">
@@ -4459,7 +4459,7 @@
               <a:rPr lang="en-US" sz="5700" dirty="0">
                 <a:latin typeface="Franklin Gothic Medium" panose="020B0603020102020204" pitchFamily="34" charset="0"/>
               </a:rPr>
-              <a:t>, Alexandra Mai, AuD</a:t>
+              <a:t>, Alexandra R. Hustedt-Mai, AuD</a:t>
             </a:r>
             <a:r>
               <a:rPr lang="en-US" sz="5700" baseline="30000" dirty="0">
@@ -4471,7 +4471,7 @@
               <a:rPr lang="en-US" sz="5700" dirty="0">
                 <a:latin typeface="Franklin Gothic Medium" panose="020B0603020102020204" pitchFamily="34" charset="0"/>
               </a:rPr>
-              <a:t>, Hari Bharadwaj, PhD</a:t>
+              <a:t>, Hari M. Bharadwaj, PhD</a:t>
             </a:r>
             <a:r>
               <a:rPr lang="en-US" sz="5700" baseline="30000" dirty="0">
@@ -4521,7 +4521,7 @@
         </p:nvSpPr>
         <p:spPr bwMode="auto">
           <a:xfrm>
-            <a:off x="457200" y="5486400"/>
+            <a:off x="457200" y="5029200"/>
             <a:ext cx="15544800" cy="1005840"/>
           </a:xfrm>
           <a:prstGeom prst="rect">
@@ -4562,7 +4562,7 @@
         </p:nvSpPr>
         <p:spPr bwMode="auto">
           <a:xfrm>
-            <a:off x="457200" y="11430000"/>
+            <a:off x="457200" y="15316200"/>
             <a:ext cx="15544800" cy="1005840"/>
           </a:xfrm>
           <a:prstGeom prst="rect">
@@ -4588,7 +4588,7 @@
               <a:rPr lang="en-US" sz="6800" dirty="0">
                 <a:latin typeface="Franklin Gothic Medium Cond" panose="020B0606030402020204" pitchFamily="34" charset="0"/>
               </a:rPr>
-              <a:t>EPL/FPL Calibration</a:t>
+              <a:t>FPL/EPL Calibration</a:t>
             </a:r>
             <a:endParaRPr lang="en-US" sz="6800" dirty="0">
               <a:solidFill>
@@ -4648,8 +4648,8 @@
         </p:nvSpPr>
         <p:spPr>
           <a:xfrm>
-            <a:off x="685800" y="6905398"/>
-            <a:ext cx="15087600" cy="584775"/>
+            <a:off x="685800" y="6536115"/>
+            <a:ext cx="15087600" cy="6494085"/>
           </a:xfrm>
           <a:prstGeom prst="rect">
             <a:avLst/>
@@ -4671,20 +4671,76 @@
                 <a:latin typeface="Franklin Gothic Medium" panose="020B0603020102020204" pitchFamily="34" charset="0"/>
                 <a:cs typeface="Arial"/>
               </a:rPr>
-              <a:t>Bullet points of background info with citations [3] </a:t>
-            </a:r>
-            <a:endParaRPr lang="en-US" sz="3200" spc="-1" dirty="0">
-              <a:solidFill>
-                <a:srgbClr val="000000"/>
-              </a:solidFill>
-              <a:uFill>
+              <a:t>Distortion product otoacoustic emissions are commonly used in the audiology clinic and in research as a measure of cochlear health, specifically outer hair cell function [X].</a:t>
+            </a:r>
+          </a:p>
+          <a:p>
+            <a:pPr marL="457200" indent="-457200">
+              <a:buFont typeface="Arial" charset="0"/>
+              <a:buChar char="•"/>
+            </a:pPr>
+            <a:r>
+              <a:rPr lang="en-US" sz="3200" dirty="0">
+                <a:latin typeface="Franklin Gothic Medium" panose="020B0603020102020204" pitchFamily="34" charset="0"/>
+                <a:cs typeface="Arial"/>
+              </a:rPr>
+              <a:t>While clinical hearing assessment via behavioral audiometry is limited to 250-8000 Hz, the extended high-frequency hearing range is most susceptible to ototoxic medications, aging, and possibly acoustic over exposure. </a:t>
+            </a:r>
+          </a:p>
+          <a:p>
+            <a:pPr marL="457200" indent="-457200">
+              <a:buFont typeface="Arial" charset="0"/>
+              <a:buChar char="•"/>
+            </a:pPr>
+            <a:r>
+              <a:rPr lang="en-US" sz="3200" dirty="0">
+                <a:latin typeface="Franklin Gothic Medium" panose="020B0603020102020204" pitchFamily="34" charset="0"/>
+                <a:cs typeface="Arial"/>
+              </a:rPr>
+              <a:t>Interpretation of high-frequency DPOAEs is complicated due to variation in emission amplitudes across repeated measures. </a:t>
+            </a:r>
+          </a:p>
+          <a:p>
+            <a:pPr marL="457200" indent="-457200">
+              <a:buFont typeface="Arial" charset="0"/>
+              <a:buChar char="•"/>
+            </a:pPr>
+            <a:r>
+              <a:rPr lang="en-US" sz="3200" spc="-1" dirty="0">
                 <a:solidFill>
-                  <a:srgbClr val="FFFFFF"/>
+                  <a:srgbClr val="000000"/>
                 </a:solidFill>
-              </a:uFill>
-              <a:latin typeface="Franklin Gothic Medium" panose="020B0603020102020204" pitchFamily="34" charset="0"/>
-              <a:cs typeface="Arial"/>
-            </a:endParaRPr>
+                <a:uFill>
+                  <a:solidFill>
+                    <a:srgbClr val="FFFFFF"/>
+                  </a:solidFill>
+                </a:uFill>
+                <a:latin typeface="Franklin Gothic Medium" panose="020B0603020102020204" pitchFamily="34" charset="0"/>
+                <a:cs typeface="Arial"/>
+              </a:rPr>
+              <a:t>One source of variation is individual ear calibration methods. Traditional SPL calibration methods do not consider standing waves generated in the ear canal. </a:t>
+            </a:r>
+          </a:p>
+          <a:p>
+            <a:pPr marL="457200" indent="-457200">
+              <a:buFont typeface="Arial" charset="0"/>
+              <a:buChar char="•"/>
+            </a:pPr>
+            <a:r>
+              <a:rPr lang="en-US" sz="3200" spc="-1" dirty="0">
+                <a:solidFill>
+                  <a:srgbClr val="000000"/>
+                </a:solidFill>
+                <a:uFill>
+                  <a:solidFill>
+                    <a:srgbClr val="FFFFFF"/>
+                  </a:solidFill>
+                </a:uFill>
+                <a:latin typeface="Franklin Gothic Medium" panose="020B0603020102020204" pitchFamily="34" charset="0"/>
+                <a:cs typeface="Arial"/>
+              </a:rPr>
+              <a:t>Newer methods that calculate forward pressure level (FPL) of stimuli and emitted pressure level (EPL) of the emission have been shown to reduce test-retest variability compared to SPL measures for either the stimulus or the emission. [1]</a:t>
+            </a:r>
           </a:p>
         </p:txBody>
       </p:sp>
@@ -4697,7 +4753,7 @@
         <p:spPr>
           <a:xfrm>
             <a:off x="35661600" y="33604200"/>
-            <a:ext cx="14630400" cy="2554545"/>
+            <a:ext cx="14630400" cy="1569660"/>
           </a:xfrm>
           <a:prstGeom prst="rect">
             <a:avLst/>
@@ -4716,127 +4772,47 @@
             </a:r>
             <a:r>
               <a:rPr lang="en-US" sz="3200" dirty="0"/>
-              <a:t>: [1] Salvi, Wang &amp; Ding, Hear Res 2000. [2] </a:t>
+              <a:t>: [1] Maxim, Shera, </a:t>
             </a:r>
             <a:r>
               <a:rPr lang="en-US" sz="3200" dirty="0" err="1"/>
-              <a:t>Resnick</a:t>
+              <a:t>Charaziak</a:t>
             </a:r>
             <a:r>
               <a:rPr lang="en-US" sz="3200" dirty="0"/>
-              <a:t> &amp; </a:t>
+              <a:t> &amp; Abdala, </a:t>
+            </a:r>
+            <a:r>
+              <a:rPr lang="en-US" sz="3200" i="1" dirty="0"/>
+              <a:t>Ear Hear </a:t>
+            </a:r>
+            <a:r>
+              <a:rPr lang="en-US" sz="3200" dirty="0"/>
+              <a:t>2019. [2] Bharadwaj, </a:t>
             </a:r>
             <a:r>
               <a:rPr lang="en-US" sz="3200" dirty="0" err="1"/>
-              <a:t>Polley</a:t>
+              <a:t>Hustedt</a:t>
             </a:r>
             <a:r>
               <a:rPr lang="en-US" sz="3200" dirty="0"/>
-              <a:t>, </a:t>
+              <a:t>-Mai, Ginsberg, Dougherty, </a:t>
             </a:r>
             <a:r>
               <a:rPr lang="en-US" sz="3200" dirty="0" err="1"/>
-              <a:t>eLife</a:t>
+              <a:t>Muthaiah</a:t>
             </a:r>
             <a:r>
               <a:rPr lang="en-US" sz="3200" dirty="0"/>
-              <a:t> 2017. [3] Bhardwaj, Mai, Ginsberg, Dougherty, </a:t>
-            </a:r>
-            <a:r>
-              <a:rPr lang="en-US" sz="3200" dirty="0" err="1"/>
-              <a:t>Muthiah</a:t>
+              <a:t>, Hagedorn, Simpson &amp; Heinz, </a:t>
+            </a:r>
+            <a:r>
+              <a:rPr lang="en-US" sz="3200" i="1" dirty="0"/>
+              <a:t>Comm Bio </a:t>
             </a:r>
             <a:r>
               <a:rPr lang="en-US" sz="3200" dirty="0"/>
-              <a:t>, Hagedorn, Simpson, &amp; Heinz </a:t>
-            </a:r>
-            <a:r>
-              <a:rPr lang="en-US" sz="3200" dirty="0" err="1"/>
-              <a:t>bioRxiv</a:t>
-            </a:r>
-            <a:r>
-              <a:rPr lang="en-US" sz="3200" dirty="0"/>
-              <a:t> 2021. [4] </a:t>
-            </a:r>
-            <a:r>
-              <a:rPr lang="en-US" sz="3200" dirty="0" err="1"/>
-              <a:t>Kuajawa</a:t>
-            </a:r>
-            <a:r>
-              <a:rPr lang="en-US" sz="3200" dirty="0"/>
-              <a:t> &amp; </a:t>
-            </a:r>
-            <a:r>
-              <a:rPr lang="en-US" sz="3200" dirty="0" err="1"/>
-              <a:t>Liberman</a:t>
-            </a:r>
-            <a:r>
-              <a:rPr lang="en-US" sz="3200" dirty="0"/>
-              <a:t> 2015 [5] </a:t>
-            </a:r>
-            <a:r>
-              <a:rPr lang="en-US" sz="3200" dirty="0" err="1"/>
-              <a:t>Eggermont</a:t>
-            </a:r>
-            <a:r>
-              <a:rPr lang="en-US" sz="3200" dirty="0"/>
-              <a:t>, Hear Res 1993. [6] Maddox &amp; Lee, </a:t>
-            </a:r>
-            <a:r>
-              <a:rPr lang="en-US" sz="3200" dirty="0" err="1"/>
-              <a:t>eNeuro</a:t>
-            </a:r>
-            <a:r>
-              <a:rPr lang="en-US" sz="3200" dirty="0"/>
-              <a:t>, 2018. [7] </a:t>
-            </a:r>
-            <a:r>
-              <a:rPr lang="en-US" sz="3200" dirty="0" err="1"/>
-              <a:t>Verhey</a:t>
-            </a:r>
-            <a:r>
-              <a:rPr lang="en-US" sz="3200" dirty="0"/>
-              <a:t>, </a:t>
-            </a:r>
-            <a:r>
-              <a:rPr lang="en-US" sz="3200" dirty="0" err="1"/>
-              <a:t>Pressnitzer</a:t>
-            </a:r>
-            <a:r>
-              <a:rPr lang="en-US" sz="3200" dirty="0"/>
-              <a:t> &amp; Winter, </a:t>
-            </a:r>
-            <a:r>
-              <a:rPr lang="en-US" sz="3200" dirty="0" err="1"/>
-              <a:t>Exp</a:t>
-            </a:r>
-            <a:r>
-              <a:rPr lang="en-US" sz="3200" dirty="0"/>
-              <a:t> Brain Res 2003. [8] </a:t>
-            </a:r>
-            <a:r>
-              <a:rPr lang="en-US" sz="3200" dirty="0" err="1"/>
-              <a:t>Caspary</a:t>
-            </a:r>
-            <a:r>
-              <a:rPr lang="en-US" sz="3200" dirty="0"/>
-              <a:t>, Ling, Turner &amp; Hughes, J </a:t>
-            </a:r>
-            <a:r>
-              <a:rPr lang="en-US" sz="3200" dirty="0" err="1"/>
-              <a:t>Exp</a:t>
-            </a:r>
-            <a:r>
-              <a:rPr lang="en-US" sz="3200" dirty="0"/>
-              <a:t> </a:t>
-            </a:r>
-            <a:r>
-              <a:rPr lang="en-US" sz="3200" dirty="0" err="1"/>
-              <a:t>Biol</a:t>
-            </a:r>
-            <a:r>
-              <a:rPr lang="en-US" sz="3200" dirty="0"/>
-              <a:t> 2008.</a:t>
+              <a:t>2022 </a:t>
             </a:r>
           </a:p>
         </p:txBody>
@@ -4849,8 +4825,8 @@
         </p:nvSpPr>
         <p:spPr>
           <a:xfrm>
-            <a:off x="1143000" y="28642353"/>
-            <a:ext cx="15087600" cy="8595360"/>
+            <a:off x="901148" y="32232600"/>
+            <a:ext cx="14630400" cy="5134930"/>
           </a:xfrm>
           <a:prstGeom prst="rect">
             <a:avLst/>
@@ -4879,7 +4855,7 @@
               <a:rPr lang="en-US" dirty="0">
                 <a:latin typeface="Franklin Gothic Medium" panose="020B0603020102020204" pitchFamily="34" charset="0"/>
               </a:rPr>
-              <a:t>Individuals aged 18 </a:t>
+              <a:t>166 individuals (61 male) age 18 </a:t>
             </a:r>
             <a:r>
               <a:rPr lang="mr-IN" dirty="0">
@@ -4891,7 +4867,7 @@
               <a:rPr lang="en-US" dirty="0">
                 <a:latin typeface="Franklin Gothic Medium" panose="020B0603020102020204" pitchFamily="34" charset="0"/>
               </a:rPr>
-              <a:t> 60 years with normal audiometric thresholds from 250-8000 Hz (n=166). </a:t>
+              <a:t> 60 years with normal audiometric thresholds from 250-8000 Hz, </a:t>
             </a:r>
           </a:p>
           <a:p>
@@ -4903,7 +4879,19 @@
               <a:rPr lang="en-US" dirty="0">
                 <a:latin typeface="Franklin Gothic Medium" panose="020B0603020102020204" pitchFamily="34" charset="0"/>
               </a:rPr>
-              <a:t>Thresholds at frequencies above 8000 Hz were allowed to vary.</a:t>
+              <a:t>Participants completed other audiological measures as part of a larger study on cochlear </a:t>
+            </a:r>
+            <a:r>
+              <a:rPr lang="en-US" dirty="0" err="1">
+                <a:latin typeface="Franklin Gothic Medium" panose="020B0603020102020204" pitchFamily="34" charset="0"/>
+              </a:rPr>
+              <a:t>synaptopathy</a:t>
+            </a:r>
+            <a:r>
+              <a:rPr lang="en-US" dirty="0">
+                <a:latin typeface="Franklin Gothic Medium" panose="020B0603020102020204" pitchFamily="34" charset="0"/>
+              </a:rPr>
+              <a:t> [2]</a:t>
             </a:r>
           </a:p>
           <a:p>
@@ -4915,81 +4903,11 @@
               <a:rPr lang="en-US" dirty="0">
                 <a:latin typeface="Franklin Gothic Medium" panose="020B0603020102020204" pitchFamily="34" charset="0"/>
               </a:rPr>
-              <a:t>Participants completed other audiological measures as part of a larger study on cochlear </a:t>
-            </a:r>
-            <a:r>
-              <a:rPr lang="en-US" dirty="0" err="1">
-                <a:latin typeface="Franklin Gothic Medium" panose="020B0603020102020204" pitchFamily="34" charset="0"/>
-              </a:rPr>
-              <a:t>synaptopathy</a:t>
-            </a:r>
-            <a:r>
-              <a:rPr lang="en-US" dirty="0">
-                <a:latin typeface="Franklin Gothic Medium" panose="020B0603020102020204" pitchFamily="34" charset="0"/>
-              </a:rPr>
-              <a:t> [Bharadwaj 2022]</a:t>
-            </a:r>
-          </a:p>
-          <a:p>
-            <a:pPr marL="457200" indent="-457200">
-              <a:buFont typeface="Arial" charset="0"/>
-              <a:buChar char="•"/>
-            </a:pPr>
+              <a:t>Because we required hearing to be within normal limits through 8000 Hz, some subjects had to be excluded. In particular, males aged 35-60. </a:t>
+            </a:r>
+          </a:p>
+          <a:p>
             <a:endParaRPr lang="en-US" dirty="0">
-              <a:latin typeface="Franklin Gothic Medium" panose="020B0603020102020204" pitchFamily="34" charset="0"/>
-            </a:endParaRPr>
-          </a:p>
-          <a:p>
-            <a:r>
-              <a:rPr lang="en-US" u="sng" dirty="0">
-                <a:latin typeface="Franklin Gothic Medium" panose="020B0603020102020204" pitchFamily="34" charset="0"/>
-              </a:rPr>
-              <a:t>Swept DPOAEs</a:t>
-            </a:r>
-          </a:p>
-          <a:p>
-            <a:pPr marL="457200" indent="-457200">
-              <a:buFont typeface="Arial" charset="0"/>
-              <a:buChar char="•"/>
-            </a:pPr>
-            <a:r>
-              <a:rPr lang="en-US" dirty="0">
-                <a:latin typeface="Franklin Gothic Medium" panose="020B0603020102020204" pitchFamily="34" charset="0"/>
-              </a:rPr>
-              <a:t>DPOAEs were measured from 2000-16000 Hz </a:t>
-            </a:r>
-          </a:p>
-          <a:p>
-            <a:pPr marL="457200" indent="-457200">
-              <a:buFont typeface="Arial" charset="0"/>
-              <a:buChar char="•"/>
-            </a:pPr>
-            <a:endParaRPr lang="en-US" dirty="0">
-              <a:latin typeface="Franklin Gothic Medium" panose="020B0603020102020204" pitchFamily="34" charset="0"/>
-            </a:endParaRPr>
-          </a:p>
-          <a:p>
-            <a:r>
-              <a:rPr lang="en-US" u="sng" dirty="0">
-                <a:latin typeface="Franklin Gothic Medium" panose="020B0603020102020204" pitchFamily="34" charset="0"/>
-              </a:rPr>
-              <a:t>Analyses</a:t>
-            </a:r>
-          </a:p>
-          <a:p>
-            <a:pPr marL="457200" indent="-457200">
-              <a:buFont typeface="Arial" panose="020B0604020202020204" pitchFamily="34" charset="0"/>
-              <a:buChar char="•"/>
-            </a:pPr>
-            <a:r>
-              <a:rPr lang="en-US" dirty="0">
-                <a:latin typeface="Franklin Gothic Medium" panose="020B0603020102020204" pitchFamily="34" charset="0"/>
-              </a:rPr>
-              <a:t>Thresholds were averaged </a:t>
-            </a:r>
-          </a:p>
-          <a:p>
-            <a:endParaRPr lang="en-US" sz="3200" dirty="0">
               <a:latin typeface="Franklin Gothic Medium" panose="020B0603020102020204" pitchFamily="34" charset="0"/>
             </a:endParaRPr>
           </a:p>
@@ -5065,25 +4983,25 @@
         </p:nvSpPr>
         <p:spPr>
           <a:xfrm>
-            <a:off x="914400" y="9220200"/>
-            <a:ext cx="14630400" cy="2743200"/>
+            <a:off x="686728" y="13221831"/>
+            <a:ext cx="14630400" cy="2246769"/>
           </a:xfrm>
           <a:prstGeom prst="rect">
             <a:avLst/>
           </a:prstGeom>
         </p:spPr>
         <p:txBody>
-          <a:bodyPr wrap="square" lIns="0" rIns="0" anchor="ctr" anchorCtr="0">
+          <a:bodyPr wrap="square" lIns="0" rIns="0" anchor="t" anchorCtr="0">
             <a:spAutoFit/>
           </a:bodyPr>
           <a:lstStyle/>
           <a:p>
             <a:pPr lvl="1" algn="ctr"/>
             <a:r>
-              <a:rPr lang="en-US" sz="3200" b="1" dirty="0">
-                <a:latin typeface="Franklin Gothic Medium" panose="020B0603020102020204" pitchFamily="34" charset="0"/>
+              <a:rPr lang="en-US" dirty="0">
+                <a:latin typeface="Franklin Gothic Demi" panose="020B0603020102020204" pitchFamily="34" charset="0"/>
               </a:rPr>
-              <a:t>Here we examined the correlations between behavioral audiometry and DPOAEs in the high-frequency and extended high-frequency ranges when using precise calibration techniques.</a:t>
+              <a:t>Here we examined the relationship between behavioral audiometry and DPOAEs in the high-frequency and extended high-frequency ranges when using FPL/EPL calibration techniques.</a:t>
             </a:r>
           </a:p>
           <a:p>
@@ -5113,7 +5031,7 @@
         </p:nvSpPr>
         <p:spPr bwMode="auto">
           <a:xfrm>
-            <a:off x="16459200" y="18288000"/>
+            <a:off x="16459200" y="26136600"/>
             <a:ext cx="18288000" cy="1005840"/>
           </a:xfrm>
           <a:prstGeom prst="rect">
@@ -5152,8 +5070,8 @@
         </p:nvSpPr>
         <p:spPr>
           <a:xfrm>
-            <a:off x="16916400" y="6858000"/>
-            <a:ext cx="17373600" cy="738664"/>
+            <a:off x="16916400" y="17526000"/>
+            <a:ext cx="17373600" cy="2215991"/>
           </a:xfrm>
           <a:prstGeom prst="rect">
             <a:avLst/>
@@ -5168,9 +5086,43 @@
           <a:p>
             <a:r>
               <a:rPr lang="en-US" sz="3200" b="1" u="sng" dirty="0">
+                <a:latin typeface="Franklin Gothic Medium" panose="020B0603020102020204" pitchFamily="34" charset="0"/>
                 <a:cs typeface="Arial"/>
               </a:rPr>
-              <a:t>Individual Swept Distortion Product Otoacoustic Emissions after Calibration </a:t>
+              <a:t>Individual Swept Distortion Product Otoacoustic Emissions after Calibration</a:t>
+            </a:r>
+          </a:p>
+          <a:p>
+            <a:pPr marL="457200" indent="-457200">
+              <a:buFont typeface="Arial" panose="020B0604020202020204" pitchFamily="34" charset="0"/>
+              <a:buChar char="•"/>
+            </a:pPr>
+            <a:r>
+              <a:rPr lang="en-US" sz="3200" dirty="0">
+                <a:latin typeface="Franklin Gothic Medium" panose="020B0603020102020204" pitchFamily="34" charset="0"/>
+                <a:cs typeface="Arial"/>
+              </a:rPr>
+              <a:t>Swept DPOAEs were measured from XXX-16 kHz. </a:t>
+            </a:r>
+          </a:p>
+          <a:p>
+            <a:pPr marL="457200" indent="-457200">
+              <a:buFont typeface="Arial" panose="020B0604020202020204" pitchFamily="34" charset="0"/>
+              <a:buChar char="•"/>
+            </a:pPr>
+            <a:r>
+              <a:rPr lang="en-US" sz="3200" dirty="0">
+                <a:latin typeface="Franklin Gothic Medium" panose="020B0603020102020204" pitchFamily="34" charset="0"/>
+                <a:cs typeface="Arial"/>
+              </a:rPr>
+              <a:t>Responses were windowed to isolate the distortion component, rather than calculate the mixed (D and R) components of the response. </a:t>
+            </a:r>
+            <a:r>
+              <a:rPr lang="en-US" sz="3200" u="sng" dirty="0">
+                <a:latin typeface="Franklin Gothic Medium" panose="020B0603020102020204" pitchFamily="34" charset="0"/>
+                <a:cs typeface="Arial"/>
+              </a:rPr>
+              <a:t> </a:t>
             </a:r>
           </a:p>
           <a:p>
@@ -5198,7 +5150,7 @@
         </p:nvSpPr>
         <p:spPr bwMode="auto">
           <a:xfrm>
-            <a:off x="35204400" y="5486400"/>
+            <a:off x="35204400" y="5029200"/>
             <a:ext cx="15544800" cy="1005840"/>
           </a:xfrm>
           <a:prstGeom prst="rect">
@@ -5245,7 +5197,7 @@
         </p:nvSpPr>
         <p:spPr bwMode="auto">
           <a:xfrm>
-            <a:off x="914400" y="27432000"/>
+            <a:off x="685800" y="30937200"/>
             <a:ext cx="15544800" cy="1005840"/>
           </a:xfrm>
           <a:prstGeom prst="rect">
@@ -5299,8 +5251,8 @@
         </p:nvSpPr>
         <p:spPr>
           <a:xfrm>
-            <a:off x="685800" y="12801600"/>
-            <a:ext cx="15087600" cy="1754326"/>
+            <a:off x="457200" y="16632651"/>
+            <a:ext cx="15544800" cy="2062103"/>
           </a:xfrm>
           <a:prstGeom prst="rect">
             <a:avLst/>
@@ -5314,23 +5266,29 @@
           <a:lstStyle/>
           <a:p>
             <a:r>
-              <a:rPr lang="en-US" b="1" u="sng" dirty="0">
+              <a:rPr lang="en-US" sz="3200" b="1" u="sng" dirty="0">
                 <a:latin typeface="Franklin Gothic Medium" panose="020B0603020102020204" pitchFamily="34" charset="0"/>
               </a:rPr>
-              <a:t>Individualized In-Ear Calibrations Increases reliability of measures in the high frequencies</a:t>
+              <a:t>FPL increases reliability of measures in the high frequencies</a:t>
             </a:r>
           </a:p>
           <a:p>
             <a:pPr marL="457200" indent="-457200">
-              <a:buFont typeface="Arial" charset="0"/>
+              <a:buFont typeface="Arial" panose="020B0604020202020204" pitchFamily="34" charset="0"/>
               <a:buChar char="•"/>
             </a:pPr>
             <a:r>
-              <a:rPr lang="en-US" dirty="0">
+              <a:rPr lang="en-US" sz="3200" dirty="0">
                 <a:latin typeface="Franklin Gothic Medium" panose="020B0603020102020204" pitchFamily="34" charset="0"/>
               </a:rPr>
-              <a:t>details</a:t>
-            </a:r>
+              <a:t>Calibrations vary significantly between individuals and across test sessions for a given subject up to 20 dB, especially in the high frequencies (&gt; 4 kHz).</a:t>
+            </a:r>
+          </a:p>
+          <a:p>
+            <a:pPr algn="ctr"/>
+            <a:endParaRPr lang="en-US" sz="3200" b="1" u="sng" dirty="0">
+              <a:latin typeface="Franklin Gothic Medium" panose="020B0603020102020204" pitchFamily="34" charset="0"/>
+            </a:endParaRPr>
           </a:p>
         </p:txBody>
       </p:sp>
@@ -5441,7 +5399,7 @@
         </p:nvSpPr>
         <p:spPr bwMode="auto">
           <a:xfrm>
-            <a:off x="16459200" y="5486400"/>
+            <a:off x="16459200" y="5029200"/>
             <a:ext cx="18288000" cy="1005840"/>
           </a:xfrm>
           <a:prstGeom prst="rect">
@@ -5547,7 +5505,7 @@
         </p:blipFill>
         <p:spPr>
           <a:xfrm>
-            <a:off x="16916400" y="19659600"/>
+            <a:off x="16916400" y="27508200"/>
             <a:ext cx="7772400" cy="7315200"/>
           </a:xfrm>
           <a:prstGeom prst="rect">
@@ -5709,7 +5667,7 @@
         </p:blipFill>
         <p:spPr>
           <a:xfrm>
-            <a:off x="25146000" y="19659600"/>
+            <a:off x="25578816" y="27523440"/>
             <a:ext cx="7772400" cy="7315200"/>
           </a:xfrm>
           <a:prstGeom prst="rect">
@@ -5805,12 +5763,84 @@
           </a:p>
         </p:txBody>
       </p:sp>
-      <p:sp>
-        <p:nvSpPr>
-          <p:cNvPr id="101" name="TextBox 100">
+      <p:pic>
+        <p:nvPicPr>
+          <p:cNvPr id="7" name="Picture 6" descr="Chart, histogram&#10;&#10;Description automatically generated">
             <a:extLst>
               <a:ext uri="{FF2B5EF4-FFF2-40B4-BE49-F238E27FC236}">
-                <a16:creationId xmlns:a16="http://schemas.microsoft.com/office/drawing/2014/main" id="{A2C5C8E4-4C39-DB80-16F1-CF35787630C9}"/>
+                <a16:creationId xmlns:a16="http://schemas.microsoft.com/office/drawing/2014/main" id="{99E8F989-6AB1-1714-44F6-E39CEF8271A6}"/>
+              </a:ext>
+            </a:extLst>
+          </p:cNvPr>
+          <p:cNvPicPr>
+            <a:picLocks noChangeAspect="1"/>
+          </p:cNvPicPr>
+          <p:nvPr/>
+        </p:nvPicPr>
+        <p:blipFill>
+          <a:blip r:embed="rId8">
+            <a:extLst>
+              <a:ext uri="{28A0092B-C50C-407E-A947-70E740481C1C}">
+                <a14:useLocalDpi xmlns:a14="http://schemas.microsoft.com/office/drawing/2010/main" val="0"/>
+              </a:ext>
+            </a:extLst>
+          </a:blip>
+          <a:stretch>
+            <a:fillRect/>
+          </a:stretch>
+        </p:blipFill>
+        <p:spPr>
+          <a:xfrm>
+            <a:off x="685800" y="18867120"/>
+            <a:ext cx="7772400" cy="5440680"/>
+          </a:xfrm>
+          <a:prstGeom prst="rect">
+            <a:avLst/>
+          </a:prstGeom>
+        </p:spPr>
+      </p:pic>
+      <p:pic>
+        <p:nvPicPr>
+          <p:cNvPr id="10" name="Picture 9" descr="Chart, histogram&#10;&#10;Description automatically generated">
+            <a:extLst>
+              <a:ext uri="{FF2B5EF4-FFF2-40B4-BE49-F238E27FC236}">
+                <a16:creationId xmlns:a16="http://schemas.microsoft.com/office/drawing/2014/main" id="{85EF3506-EDB3-CAC1-9FA9-9C78811F8251}"/>
+              </a:ext>
+            </a:extLst>
+          </p:cNvPr>
+          <p:cNvPicPr>
+            <a:picLocks noChangeAspect="1"/>
+          </p:cNvPicPr>
+          <p:nvPr/>
+        </p:nvPicPr>
+        <p:blipFill>
+          <a:blip r:embed="rId9">
+            <a:extLst>
+              <a:ext uri="{28A0092B-C50C-407E-A947-70E740481C1C}">
+                <a14:useLocalDpi xmlns:a14="http://schemas.microsoft.com/office/drawing/2010/main" val="0"/>
+              </a:ext>
+            </a:extLst>
+          </a:blip>
+          <a:stretch>
+            <a:fillRect/>
+          </a:stretch>
+        </p:blipFill>
+        <p:spPr>
+          <a:xfrm>
+            <a:off x="8458200" y="18867120"/>
+            <a:ext cx="7772400" cy="5440680"/>
+          </a:xfrm>
+          <a:prstGeom prst="rect">
+            <a:avLst/>
+          </a:prstGeom>
+        </p:spPr>
+      </p:pic>
+      <p:sp>
+        <p:nvSpPr>
+          <p:cNvPr id="17" name="TextBox 16">
+            <a:extLst>
+              <a:ext uri="{FF2B5EF4-FFF2-40B4-BE49-F238E27FC236}">
+                <a16:creationId xmlns:a16="http://schemas.microsoft.com/office/drawing/2014/main" id="{04DBC4F7-69BB-DB86-77E7-C8957FB149E5}"/>
               </a:ext>
             </a:extLst>
           </p:cNvPr>
@@ -5819,8 +5849,8 @@
         </p:nvSpPr>
         <p:spPr>
           <a:xfrm>
-            <a:off x="16916400" y="12596336"/>
-            <a:ext cx="17373600" cy="738664"/>
+            <a:off x="685800" y="24765000"/>
+            <a:ext cx="15087600" cy="5909310"/>
           </a:xfrm>
           <a:prstGeom prst="rect">
             <a:avLst/>
@@ -5828,24 +5858,78 @@
           <a:noFill/>
         </p:spPr>
         <p:txBody>
-          <a:bodyPr wrap="square" rtlCol="0">
+          <a:bodyPr wrap="square">
             <a:spAutoFit/>
           </a:bodyPr>
           <a:lstStyle/>
           <a:p>
             <a:r>
-              <a:rPr lang="en-US" sz="3200" b="1" u="sng" dirty="0">
-                <a:cs typeface="Arial"/>
+              <a:rPr lang="en-US" u="sng" dirty="0">
+                <a:latin typeface="Franklin Gothic Medium" panose="020B0603020102020204" pitchFamily="34" charset="0"/>
               </a:rPr>
-              <a:t>Analysis Windows Isolate the Distortion Component</a:t>
+              <a:t>Probe Calibration</a:t>
             </a:r>
           </a:p>
           <a:p>
             <a:pPr marL="457200" indent="-457200">
-              <a:buFont typeface="Arial"/>
+              <a:buFont typeface="Arial" charset="0"/>
               <a:buChar char="•"/>
             </a:pPr>
-            <a:endParaRPr lang="en-US" sz="1000" b="1" u="sng" dirty="0"/>
+            <a:r>
+              <a:rPr lang="en-US" dirty="0">
+                <a:latin typeface="Franklin Gothic Medium" panose="020B0603020102020204" pitchFamily="34" charset="0"/>
+              </a:rPr>
+              <a:t>The ER-10X probe was calibrated by coupling the </a:t>
+            </a:r>
+            <a:r>
+              <a:rPr lang="en-US" dirty="0" err="1">
+                <a:latin typeface="Franklin Gothic Medium" panose="020B0603020102020204" pitchFamily="34" charset="0"/>
+              </a:rPr>
+              <a:t>eartip</a:t>
+            </a:r>
+            <a:r>
+              <a:rPr lang="en-US" dirty="0">
+                <a:latin typeface="Franklin Gothic Medium" panose="020B0603020102020204" pitchFamily="34" charset="0"/>
+              </a:rPr>
+              <a:t> to the ER-10X calibrator (brass cylinders of 8 mm diameter and 5 different lengths) and measuring the response to a click probe to estimate the Thevenin-equivalent source pressure and impedance. </a:t>
+            </a:r>
+          </a:p>
+          <a:p>
+            <a:endParaRPr lang="en-US" sz="1800" dirty="0">
+              <a:latin typeface="Franklin Gothic Medium" panose="020B0603020102020204" pitchFamily="34" charset="0"/>
+            </a:endParaRPr>
+          </a:p>
+          <a:p>
+            <a:r>
+              <a:rPr lang="en-US" u="sng" dirty="0">
+                <a:latin typeface="Franklin Gothic Medium" panose="020B0603020102020204" pitchFamily="34" charset="0"/>
+              </a:rPr>
+              <a:t>In-ear Calibration</a:t>
+            </a:r>
+          </a:p>
+          <a:p>
+            <a:pPr marL="571500" indent="-571500">
+              <a:buFont typeface="Arial" panose="020B0604020202020204" pitchFamily="34" charset="0"/>
+              <a:buChar char="•"/>
+            </a:pPr>
+            <a:r>
+              <a:rPr lang="en-US" dirty="0">
+                <a:latin typeface="Franklin Gothic Medium" panose="020B0603020102020204" pitchFamily="34" charset="0"/>
+              </a:rPr>
+              <a:t>Once the </a:t>
+            </a:r>
+            <a:r>
+              <a:rPr lang="en-US" dirty="0" err="1">
+                <a:latin typeface="Franklin Gothic Medium" panose="020B0603020102020204" pitchFamily="34" charset="0"/>
+              </a:rPr>
+              <a:t>eartip</a:t>
+            </a:r>
+            <a:r>
+              <a:rPr lang="en-US" dirty="0">
+                <a:latin typeface="Franklin Gothic Medium" panose="020B0603020102020204" pitchFamily="34" charset="0"/>
+              </a:rPr>
+              <a:t> was placed in the subject’s ear, the click stimulus was used to estimate the immittance properties of the subject’s ear. Low-frequency (200-500 Hz average) ear absorbance was less than 29% to ensure an adequate seal was acquired. </a:t>
+            </a:r>
           </a:p>
         </p:txBody>
       </p:sp>

</xml_diff>

<commit_message>
from late thurs. edits to figures and poster
</commit_message>
<xml_diff>
--- a/ARO2023_HF_DPOAE_Poster.pptx
+++ b/ARO2023_HF_DPOAE_Poster.pptx
@@ -230,14 +230,14 @@
           </a:ln>
           <a:extLst>
             <a:ext uri="{909E8E84-426E-40dd-AFC4-6F175D3DCCD1}">
-              <a14:hiddenFill xmlns:a14="http://schemas.microsoft.com/office/drawing/2010/main" xmlns="">
+              <a14:hiddenFill xmlns="" xmlns:a14="http://schemas.microsoft.com/office/drawing/2010/main">
                 <a:solidFill>
                   <a:schemeClr val="accent1"/>
                 </a:solidFill>
               </a14:hiddenFill>
             </a:ext>
             <a:ext uri="{91240B29-F687-4f45-9708-019B960494DF}">
-              <a14:hiddenLine xmlns:a14="http://schemas.microsoft.com/office/drawing/2010/main" xmlns="" w="9525">
+              <a14:hiddenLine xmlns="" xmlns:a14="http://schemas.microsoft.com/office/drawing/2010/main" w="9525">
                 <a:solidFill>
                   <a:schemeClr val="tx1"/>
                 </a:solidFill>
@@ -247,7 +247,7 @@
               </a14:hiddenLine>
             </a:ext>
             <a:ext uri="{AF507438-7753-43e0-B8FC-AC1667EBCBE1}">
-              <a14:hiddenEffects xmlns:a14="http://schemas.microsoft.com/office/drawing/2010/main" xmlns="">
+              <a14:hiddenEffects xmlns="" xmlns:a14="http://schemas.microsoft.com/office/drawing/2010/main">
                 <a:effectLst>
                   <a:outerShdw dist="35921" dir="2700000" algn="ctr" rotWithShape="0">
                     <a:schemeClr val="bg2"/>
@@ -303,14 +303,14 @@
           </a:ln>
           <a:extLst>
             <a:ext uri="{909E8E84-426E-40dd-AFC4-6F175D3DCCD1}">
-              <a14:hiddenFill xmlns:a14="http://schemas.microsoft.com/office/drawing/2010/main" xmlns="">
+              <a14:hiddenFill xmlns="" xmlns:a14="http://schemas.microsoft.com/office/drawing/2010/main">
                 <a:solidFill>
                   <a:schemeClr val="accent1"/>
                 </a:solidFill>
               </a14:hiddenFill>
             </a:ext>
             <a:ext uri="{91240B29-F687-4f45-9708-019B960494DF}">
-              <a14:hiddenLine xmlns:a14="http://schemas.microsoft.com/office/drawing/2010/main" xmlns="" w="9525">
+              <a14:hiddenLine xmlns="" xmlns:a14="http://schemas.microsoft.com/office/drawing/2010/main" w="9525">
                 <a:solidFill>
                   <a:schemeClr val="tx1"/>
                 </a:solidFill>
@@ -320,7 +320,7 @@
               </a14:hiddenLine>
             </a:ext>
             <a:ext uri="{AF507438-7753-43e0-B8FC-AC1667EBCBE1}">
-              <a14:hiddenEffects xmlns:a14="http://schemas.microsoft.com/office/drawing/2010/main" xmlns="">
+              <a14:hiddenEffects xmlns="" xmlns:a14="http://schemas.microsoft.com/office/drawing/2010/main">
                 <a:effectLst>
                   <a:outerShdw dist="35921" dir="2700000" algn="ctr" rotWithShape="0">
                     <a:schemeClr val="bg2"/>
@@ -376,14 +376,14 @@
           </a:ln>
           <a:extLst>
             <a:ext uri="{909E8E84-426E-40dd-AFC4-6F175D3DCCD1}">
-              <a14:hiddenFill xmlns:a14="http://schemas.microsoft.com/office/drawing/2010/main" xmlns="">
+              <a14:hiddenFill xmlns="" xmlns:a14="http://schemas.microsoft.com/office/drawing/2010/main">
                 <a:solidFill>
                   <a:schemeClr val="accent1"/>
                 </a:solidFill>
               </a14:hiddenFill>
             </a:ext>
             <a:ext uri="{91240B29-F687-4f45-9708-019B960494DF}">
-              <a14:hiddenLine xmlns:a14="http://schemas.microsoft.com/office/drawing/2010/main" xmlns="" w="9525">
+              <a14:hiddenLine xmlns="" xmlns:a14="http://schemas.microsoft.com/office/drawing/2010/main" w="9525">
                 <a:solidFill>
                   <a:schemeClr val="tx1"/>
                 </a:solidFill>
@@ -393,7 +393,7 @@
               </a14:hiddenLine>
             </a:ext>
             <a:ext uri="{AF507438-7753-43e0-B8FC-AC1667EBCBE1}">
-              <a14:hiddenEffects xmlns:a14="http://schemas.microsoft.com/office/drawing/2010/main" xmlns="">
+              <a14:hiddenEffects xmlns="" xmlns:a14="http://schemas.microsoft.com/office/drawing/2010/main">
                 <a:effectLst>
                   <a:outerShdw dist="35921" dir="2700000" algn="ctr" rotWithShape="0">
                     <a:schemeClr val="bg2"/>
@@ -449,14 +449,14 @@
           </a:ln>
           <a:extLst>
             <a:ext uri="{909E8E84-426E-40dd-AFC4-6F175D3DCCD1}">
-              <a14:hiddenFill xmlns:a14="http://schemas.microsoft.com/office/drawing/2010/main" xmlns="">
+              <a14:hiddenFill xmlns="" xmlns:a14="http://schemas.microsoft.com/office/drawing/2010/main">
                 <a:solidFill>
                   <a:schemeClr val="accent1"/>
                 </a:solidFill>
               </a14:hiddenFill>
             </a:ext>
             <a:ext uri="{91240B29-F687-4f45-9708-019B960494DF}">
-              <a14:hiddenLine xmlns:a14="http://schemas.microsoft.com/office/drawing/2010/main" xmlns="" w="9525">
+              <a14:hiddenLine xmlns="" xmlns:a14="http://schemas.microsoft.com/office/drawing/2010/main" w="9525">
                 <a:solidFill>
                   <a:schemeClr val="tx1"/>
                 </a:solidFill>
@@ -466,7 +466,7 @@
               </a14:hiddenLine>
             </a:ext>
             <a:ext uri="{AF507438-7753-43e0-B8FC-AC1667EBCBE1}">
-              <a14:hiddenEffects xmlns:a14="http://schemas.microsoft.com/office/drawing/2010/main" xmlns="">
+              <a14:hiddenEffects xmlns="" xmlns:a14="http://schemas.microsoft.com/office/drawing/2010/main">
                 <a:effectLst>
                   <a:outerShdw dist="35921" dir="2700000" algn="ctr" rotWithShape="0">
                     <a:schemeClr val="bg2"/>
@@ -565,14 +565,14 @@
           </a:ln>
           <a:extLst>
             <a:ext uri="{909E8E84-426E-40dd-AFC4-6F175D3DCCD1}">
-              <a14:hiddenFill xmlns:a14="http://schemas.microsoft.com/office/drawing/2010/main" xmlns="">
+              <a14:hiddenFill xmlns="" xmlns:a14="http://schemas.microsoft.com/office/drawing/2010/main">
                 <a:solidFill>
                   <a:schemeClr val="accent1"/>
                 </a:solidFill>
               </a14:hiddenFill>
             </a:ext>
             <a:ext uri="{91240B29-F687-4f45-9708-019B960494DF}">
-              <a14:hiddenLine xmlns:a14="http://schemas.microsoft.com/office/drawing/2010/main" xmlns="" w="9525">
+              <a14:hiddenLine xmlns="" xmlns:a14="http://schemas.microsoft.com/office/drawing/2010/main" w="9525">
                 <a:solidFill>
                   <a:schemeClr val="tx1"/>
                 </a:solidFill>
@@ -582,7 +582,7 @@
               </a14:hiddenLine>
             </a:ext>
             <a:ext uri="{AF507438-7753-43e0-B8FC-AC1667EBCBE1}">
-              <a14:hiddenEffects xmlns:a14="http://schemas.microsoft.com/office/drawing/2010/main" xmlns="">
+              <a14:hiddenEffects xmlns="" xmlns:a14="http://schemas.microsoft.com/office/drawing/2010/main">
                 <a:effectLst>
                   <a:outerShdw dist="35921" dir="2700000" algn="ctr" rotWithShape="0">
                     <a:schemeClr val="bg2"/>
@@ -638,14 +638,14 @@
           </a:ln>
           <a:extLst>
             <a:ext uri="{909E8E84-426E-40dd-AFC4-6F175D3DCCD1}">
-              <a14:hiddenFill xmlns:a14="http://schemas.microsoft.com/office/drawing/2010/main" xmlns="">
+              <a14:hiddenFill xmlns="" xmlns:a14="http://schemas.microsoft.com/office/drawing/2010/main">
                 <a:solidFill>
                   <a:schemeClr val="accent1"/>
                 </a:solidFill>
               </a14:hiddenFill>
             </a:ext>
             <a:ext uri="{91240B29-F687-4f45-9708-019B960494DF}">
-              <a14:hiddenLine xmlns:a14="http://schemas.microsoft.com/office/drawing/2010/main" xmlns="" w="9525">
+              <a14:hiddenLine xmlns="" xmlns:a14="http://schemas.microsoft.com/office/drawing/2010/main" w="9525">
                 <a:solidFill>
                   <a:schemeClr val="tx1"/>
                 </a:solidFill>
@@ -655,7 +655,7 @@
               </a14:hiddenLine>
             </a:ext>
             <a:ext uri="{AF507438-7753-43e0-B8FC-AC1667EBCBE1}">
-              <a14:hiddenEffects xmlns:a14="http://schemas.microsoft.com/office/drawing/2010/main" xmlns="">
+              <a14:hiddenEffects xmlns="" xmlns:a14="http://schemas.microsoft.com/office/drawing/2010/main">
                 <a:effectLst>
                   <a:outerShdw dist="35921" dir="2700000" algn="ctr" rotWithShape="0">
                     <a:schemeClr val="bg2"/>
@@ -714,14 +714,14 @@
           </a:ln>
           <a:extLst>
             <a:ext uri="{909E8E84-426E-40dd-AFC4-6F175D3DCCD1}">
-              <a14:hiddenFill xmlns:a14="http://schemas.microsoft.com/office/drawing/2010/main" xmlns="">
+              <a14:hiddenFill xmlns="" xmlns:a14="http://schemas.microsoft.com/office/drawing/2010/main">
                 <a:solidFill>
                   <a:srgbClr val="FFFFFF"/>
                 </a:solidFill>
               </a14:hiddenFill>
             </a:ext>
             <a:ext uri="{AF507438-7753-43e0-B8FC-AC1667EBCBE1}">
-              <a14:hiddenEffects xmlns:a14="http://schemas.microsoft.com/office/drawing/2010/main" xmlns="">
+              <a14:hiddenEffects xmlns="" xmlns:a14="http://schemas.microsoft.com/office/drawing/2010/main">
                 <a:effectLst>
                   <a:outerShdw dist="35921" dir="2700000" algn="ctr" rotWithShape="0">
                     <a:srgbClr val="808080"/>
@@ -730,7 +730,7 @@
               </a14:hiddenEffects>
             </a:ext>
             <a:ext uri="{53640926-AAD7-44d8-BBD7-CCE9431645EC}">
-              <a14:shadowObscured xmlns:a14="http://schemas.microsoft.com/office/drawing/2010/main" xmlns="" val="1"/>
+              <a14:shadowObscured xmlns="" xmlns:a14="http://schemas.microsoft.com/office/drawing/2010/main" val="1"/>
             </a:ext>
           </a:extLst>
         </p:spPr>
@@ -759,14 +759,14 @@
           </a:ln>
           <a:extLst>
             <a:ext uri="{909E8E84-426E-40dd-AFC4-6F175D3DCCD1}">
-              <a14:hiddenFill xmlns:a14="http://schemas.microsoft.com/office/drawing/2010/main" xmlns="">
+              <a14:hiddenFill xmlns="" xmlns:a14="http://schemas.microsoft.com/office/drawing/2010/main">
                 <a:solidFill>
                   <a:schemeClr val="accent1"/>
                 </a:solidFill>
               </a14:hiddenFill>
             </a:ext>
             <a:ext uri="{91240B29-F687-4f45-9708-019B960494DF}">
-              <a14:hiddenLine xmlns:a14="http://schemas.microsoft.com/office/drawing/2010/main" xmlns="" w="9525">
+              <a14:hiddenLine xmlns="" xmlns:a14="http://schemas.microsoft.com/office/drawing/2010/main" w="9525">
                 <a:solidFill>
                   <a:schemeClr val="tx1"/>
                 </a:solidFill>
@@ -776,7 +776,7 @@
               </a14:hiddenLine>
             </a:ext>
             <a:ext uri="{AF507438-7753-43e0-B8FC-AC1667EBCBE1}">
-              <a14:hiddenEffects xmlns:a14="http://schemas.microsoft.com/office/drawing/2010/main" xmlns="">
+              <a14:hiddenEffects xmlns="" xmlns:a14="http://schemas.microsoft.com/office/drawing/2010/main">
                 <a:effectLst>
                   <a:outerShdw dist="35921" dir="2700000" algn="ctr" rotWithShape="0">
                     <a:schemeClr val="bg2"/>
@@ -858,14 +858,14 @@
           </a:ln>
           <a:extLst>
             <a:ext uri="{909E8E84-426E-40dd-AFC4-6F175D3DCCD1}">
-              <a14:hiddenFill xmlns:a14="http://schemas.microsoft.com/office/drawing/2010/main" xmlns="">
+              <a14:hiddenFill xmlns="" xmlns:a14="http://schemas.microsoft.com/office/drawing/2010/main">
                 <a:solidFill>
                   <a:schemeClr val="accent1"/>
                 </a:solidFill>
               </a14:hiddenFill>
             </a:ext>
             <a:ext uri="{91240B29-F687-4f45-9708-019B960494DF}">
-              <a14:hiddenLine xmlns:a14="http://schemas.microsoft.com/office/drawing/2010/main" xmlns="" w="9525">
+              <a14:hiddenLine xmlns="" xmlns:a14="http://schemas.microsoft.com/office/drawing/2010/main" w="9525">
                 <a:solidFill>
                   <a:schemeClr val="tx1"/>
                 </a:solidFill>
@@ -875,7 +875,7 @@
               </a14:hiddenLine>
             </a:ext>
             <a:ext uri="{AF507438-7753-43e0-B8FC-AC1667EBCBE1}">
-              <a14:hiddenEffects xmlns:a14="http://schemas.microsoft.com/office/drawing/2010/main" xmlns="">
+              <a14:hiddenEffects xmlns="" xmlns:a14="http://schemas.microsoft.com/office/drawing/2010/main">
                 <a:effectLst>
                   <a:outerShdw dist="35921" dir="2700000" algn="ctr" rotWithShape="0">
                     <a:schemeClr val="bg2"/>
@@ -931,14 +931,14 @@
           </a:ln>
           <a:extLst>
             <a:ext uri="{909E8E84-426E-40dd-AFC4-6F175D3DCCD1}">
-              <a14:hiddenFill xmlns:a14="http://schemas.microsoft.com/office/drawing/2010/main" xmlns="">
+              <a14:hiddenFill xmlns="" xmlns:a14="http://schemas.microsoft.com/office/drawing/2010/main">
                 <a:solidFill>
                   <a:schemeClr val="accent1"/>
                 </a:solidFill>
               </a14:hiddenFill>
             </a:ext>
             <a:ext uri="{91240B29-F687-4f45-9708-019B960494DF}">
-              <a14:hiddenLine xmlns:a14="http://schemas.microsoft.com/office/drawing/2010/main" xmlns="" w="9525">
+              <a14:hiddenLine xmlns="" xmlns:a14="http://schemas.microsoft.com/office/drawing/2010/main" w="9525">
                 <a:solidFill>
                   <a:schemeClr val="tx1"/>
                 </a:solidFill>
@@ -948,7 +948,7 @@
               </a14:hiddenLine>
             </a:ext>
             <a:ext uri="{AF507438-7753-43e0-B8FC-AC1667EBCBE1}">
-              <a14:hiddenEffects xmlns:a14="http://schemas.microsoft.com/office/drawing/2010/main" xmlns="">
+              <a14:hiddenEffects xmlns="" xmlns:a14="http://schemas.microsoft.com/office/drawing/2010/main">
                 <a:effectLst>
                   <a:outerShdw dist="35921" dir="2700000" algn="ctr" rotWithShape="0">
                     <a:schemeClr val="bg2"/>
@@ -4435,7 +4435,7 @@
               <a:rPr lang="en-US" sz="5700" u="sng" dirty="0">
                 <a:latin typeface="Franklin Gothic Medium" panose="020B0603020102020204" pitchFamily="34" charset="0"/>
               </a:rPr>
-              <a:t>Samantha N. Hauser, AuD</a:t>
+              <a:t>Samantha Hauser, AuD</a:t>
             </a:r>
             <a:r>
               <a:rPr lang="en-US" sz="5700" baseline="30000" dirty="0">
@@ -4459,7 +4459,19 @@
               <a:rPr lang="en-US" sz="5700" dirty="0">
                 <a:latin typeface="Franklin Gothic Medium" panose="020B0603020102020204" pitchFamily="34" charset="0"/>
               </a:rPr>
-              <a:t>, Alexandra R. Hustedt-Mai, AuD</a:t>
+              <a:t>, Alexandra </a:t>
+            </a:r>
+            <a:r>
+              <a:rPr lang="en-US" sz="5700" dirty="0" err="1">
+                <a:latin typeface="Franklin Gothic Medium" panose="020B0603020102020204" pitchFamily="34" charset="0"/>
+              </a:rPr>
+              <a:t>Hustedt</a:t>
+            </a:r>
+            <a:r>
+              <a:rPr lang="en-US" sz="5700" dirty="0">
+                <a:latin typeface="Franklin Gothic Medium" panose="020B0603020102020204" pitchFamily="34" charset="0"/>
+              </a:rPr>
+              <a:t>-Mai, AuD</a:t>
             </a:r>
             <a:r>
               <a:rPr lang="en-US" sz="5700" baseline="30000" dirty="0">
@@ -4471,7 +4483,7 @@
               <a:rPr lang="en-US" sz="5700" dirty="0">
                 <a:latin typeface="Franklin Gothic Medium" panose="020B0603020102020204" pitchFamily="34" charset="0"/>
               </a:rPr>
-              <a:t>, Hari M. Bharadwaj, PhD</a:t>
+              <a:t>, Hari Bharadwaj, PhD</a:t>
             </a:r>
             <a:r>
               <a:rPr lang="en-US" sz="5700" baseline="30000" dirty="0">
@@ -4506,7 +4518,7 @@
               <a:rPr lang="en-US" dirty="0">
                 <a:latin typeface="Franklin Gothic Medium" panose="020B0603020102020204" pitchFamily="34" charset="0"/>
               </a:rPr>
-              <a:t>University of Pittsburgh</a:t>
+              <a:t>Communication Science and Disorders, University of Pittsburgh</a:t>
             </a:r>
           </a:p>
         </p:txBody>
@@ -4522,7 +4534,7 @@
         <p:spPr bwMode="auto">
           <a:xfrm>
             <a:off x="457200" y="5029200"/>
-            <a:ext cx="15544800" cy="1005840"/>
+            <a:ext cx="16459200" cy="1005840"/>
           </a:xfrm>
           <a:prstGeom prst="rect">
             <a:avLst/>
@@ -4562,8 +4574,8 @@
         </p:nvSpPr>
         <p:spPr bwMode="auto">
           <a:xfrm>
-            <a:off x="457200" y="15316200"/>
-            <a:ext cx="15544800" cy="1005840"/>
+            <a:off x="457200" y="14576941"/>
+            <a:ext cx="16459200" cy="1005840"/>
           </a:xfrm>
           <a:prstGeom prst="rect">
             <a:avLst/>
@@ -4609,8 +4621,8 @@
         </p:nvSpPr>
         <p:spPr bwMode="auto">
           <a:xfrm>
-            <a:off x="35204400" y="16992600"/>
-            <a:ext cx="15544800" cy="1005840"/>
+            <a:off x="34305240" y="21120021"/>
+            <a:ext cx="16459200" cy="1005840"/>
           </a:xfrm>
           <a:prstGeom prst="rect">
             <a:avLst/>
@@ -4648,8 +4660,8 @@
         </p:nvSpPr>
         <p:spPr>
           <a:xfrm>
-            <a:off x="685800" y="6536115"/>
-            <a:ext cx="15087600" cy="6494085"/>
+            <a:off x="685800" y="6172200"/>
+            <a:ext cx="16001072" cy="6494085"/>
           </a:xfrm>
           <a:prstGeom prst="rect">
             <a:avLst/>
@@ -4671,7 +4683,7 @@
                 <a:latin typeface="Franklin Gothic Medium" panose="020B0603020102020204" pitchFamily="34" charset="0"/>
                 <a:cs typeface="Arial"/>
               </a:rPr>
-              <a:t>Distortion product otoacoustic emissions are commonly used in the audiology clinic and in research as a measure of cochlear health, specifically outer hair cell function [X].</a:t>
+              <a:t>Distortion product otoacoustic emissions (DPOAEs) are commonly used in the audiology clinic and in research as a measure of cochlear health, specifically outer hair cell function [X].</a:t>
             </a:r>
           </a:p>
           <a:p>
@@ -4752,8 +4764,8 @@
         </p:nvSpPr>
         <p:spPr>
           <a:xfrm>
-            <a:off x="35661600" y="33604200"/>
-            <a:ext cx="14630400" cy="1569660"/>
+            <a:off x="34518600" y="33439843"/>
+            <a:ext cx="16002000" cy="1569660"/>
           </a:xfrm>
           <a:prstGeom prst="rect">
             <a:avLst/>
@@ -4812,7 +4824,31 @@
             </a:r>
             <a:r>
               <a:rPr lang="en-US" sz="3200" dirty="0"/>
-              <a:t>2022 </a:t>
+              <a:t>2022 [3] </a:t>
+            </a:r>
+            <a:r>
+              <a:rPr lang="en-US" sz="3200" dirty="0" err="1"/>
+              <a:t>Rasetshwane</a:t>
+            </a:r>
+            <a:r>
+              <a:rPr lang="en-US" sz="3200" dirty="0"/>
+              <a:t> &amp; Neely, </a:t>
+            </a:r>
+            <a:r>
+              <a:rPr lang="en-US" sz="3200" i="1" dirty="0"/>
+              <a:t>J </a:t>
+            </a:r>
+            <a:r>
+              <a:rPr lang="en-US" sz="3200" i="1" dirty="0" err="1"/>
+              <a:t>Acoust</a:t>
+            </a:r>
+            <a:r>
+              <a:rPr lang="en-US" sz="3200" i="1" dirty="0"/>
+              <a:t> Soc Am. </a:t>
+            </a:r>
+            <a:r>
+              <a:rPr lang="en-US" sz="3200" dirty="0"/>
+              <a:t>2011 </a:t>
             </a:r>
           </a:p>
         </p:txBody>
@@ -4825,8 +4861,8 @@
         </p:nvSpPr>
         <p:spPr>
           <a:xfrm>
-            <a:off x="901148" y="32232600"/>
-            <a:ext cx="14630400" cy="5134930"/>
+            <a:off x="17508682" y="12977752"/>
+            <a:ext cx="16002000" cy="3623489"/>
           </a:xfrm>
           <a:prstGeom prst="rect">
             <a:avLst/>
@@ -4840,7 +4876,7 @@
           <a:lstStyle/>
           <a:p>
             <a:r>
-              <a:rPr lang="en-US" u="sng" dirty="0">
+              <a:rPr lang="en-US" sz="3200" u="sng" dirty="0">
                 <a:latin typeface="Franklin Gothic Medium" panose="020B0603020102020204" pitchFamily="34" charset="0"/>
               </a:rPr>
               <a:t>Participants</a:t>
@@ -4852,22 +4888,22 @@
               <a:buChar char="•"/>
             </a:pPr>
             <a:r>
-              <a:rPr lang="en-US" dirty="0">
+              <a:rPr lang="en-US" sz="3200" dirty="0">
                 <a:latin typeface="Franklin Gothic Medium" panose="020B0603020102020204" pitchFamily="34" charset="0"/>
               </a:rPr>
               <a:t>166 individuals (61 male) age 18 </a:t>
             </a:r>
             <a:r>
-              <a:rPr lang="mr-IN" dirty="0">
+              <a:rPr lang="mr-IN" sz="3200" dirty="0">
                 <a:latin typeface="Franklin Gothic Medium" panose="020B0603020102020204" pitchFamily="34" charset="0"/>
               </a:rPr>
               <a:t>–</a:t>
             </a:r>
             <a:r>
-              <a:rPr lang="en-US" dirty="0">
+              <a:rPr lang="en-US" sz="3200" dirty="0">
                 <a:latin typeface="Franklin Gothic Medium" panose="020B0603020102020204" pitchFamily="34" charset="0"/>
               </a:rPr>
-              <a:t> 60 years with normal audiometric thresholds from 250-8000 Hz, </a:t>
+              <a:t> 60 years with normal audiometric thresholds from 250-8000 Hz. </a:t>
             </a:r>
           </a:p>
           <a:p>
@@ -4876,22 +4912,64 @@
               <a:buChar char="•"/>
             </a:pPr>
             <a:r>
-              <a:rPr lang="en-US" dirty="0">
+              <a:rPr lang="en-US" sz="3200" dirty="0">
                 <a:latin typeface="Franklin Gothic Medium" panose="020B0603020102020204" pitchFamily="34" charset="0"/>
               </a:rPr>
               <a:t>Participants completed other audiological measures as part of a larger study on cochlear </a:t>
             </a:r>
             <a:r>
-              <a:rPr lang="en-US" dirty="0" err="1">
+              <a:rPr lang="en-US" sz="3200" dirty="0" err="1">
                 <a:latin typeface="Franklin Gothic Medium" panose="020B0603020102020204" pitchFamily="34" charset="0"/>
               </a:rPr>
               <a:t>synaptopathy</a:t>
             </a:r>
             <a:r>
-              <a:rPr lang="en-US" dirty="0">
+              <a:rPr lang="en-US" sz="3200" dirty="0">
                 <a:latin typeface="Franklin Gothic Medium" panose="020B0603020102020204" pitchFamily="34" charset="0"/>
               </a:rPr>
-              <a:t> [2]</a:t>
+              <a:t> [2]. Because we required hearing to be within normal limits through 8000 Hz, some subjects had to be excluded. In particular, males and people aged 35-60. </a:t>
+            </a:r>
+          </a:p>
+          <a:p>
+            <a:r>
+              <a:rPr lang="en-US" sz="3200" b="1" u="sng" dirty="0">
+                <a:latin typeface="Franklin Gothic Medium" panose="020B0603020102020204" pitchFamily="34" charset="0"/>
+                <a:cs typeface="Arial"/>
+              </a:rPr>
+              <a:t>Individual Swept Distortion Product Otoacoustic Emissions after Calibration</a:t>
+            </a:r>
+          </a:p>
+          <a:p>
+            <a:pPr marL="457200" indent="-457200">
+              <a:buFont typeface="Arial" panose="020B0604020202020204" pitchFamily="34" charset="0"/>
+              <a:buChar char="•"/>
+            </a:pPr>
+            <a:r>
+              <a:rPr lang="en-US" sz="3200" dirty="0">
+                <a:latin typeface="Franklin Gothic Medium" panose="020B0603020102020204" pitchFamily="34" charset="0"/>
+                <a:cs typeface="Arial"/>
+              </a:rPr>
+              <a:t>Swept DPOAEs were measured from 2-16 kHz. </a:t>
+            </a:r>
+          </a:p>
+          <a:p>
+            <a:pPr marL="457200" indent="-457200">
+              <a:buFont typeface="Arial" panose="020B0604020202020204" pitchFamily="34" charset="0"/>
+              <a:buChar char="•"/>
+            </a:pPr>
+            <a:r>
+              <a:rPr lang="en-US" sz="3200" dirty="0">
+                <a:latin typeface="Franklin Gothic Medium" panose="020B0603020102020204" pitchFamily="34" charset="0"/>
+                <a:cs typeface="Arial"/>
+              </a:rPr>
+              <a:t>Responses were windowed to isolate the distortion component, rather than calculate the mixed (D and R) components of the response. </a:t>
+            </a:r>
+            <a:r>
+              <a:rPr lang="en-US" sz="3200" u="sng" dirty="0">
+                <a:latin typeface="Franklin Gothic Medium" panose="020B0603020102020204" pitchFamily="34" charset="0"/>
+                <a:cs typeface="Arial"/>
+              </a:rPr>
+              <a:t> </a:t>
             </a:r>
           </a:p>
           <a:p>
@@ -4899,15 +4977,12 @@
               <a:buFont typeface="Arial" charset="0"/>
               <a:buChar char="•"/>
             </a:pPr>
-            <a:r>
-              <a:rPr lang="en-US" dirty="0">
-                <a:latin typeface="Franklin Gothic Medium" panose="020B0603020102020204" pitchFamily="34" charset="0"/>
-              </a:rPr>
-              <a:t>Because we required hearing to be within normal limits through 8000 Hz, some subjects had to be excluded. In particular, males aged 35-60. </a:t>
-            </a:r>
-          </a:p>
-          <a:p>
-            <a:endParaRPr lang="en-US" dirty="0">
+            <a:endParaRPr lang="en-US" sz="3200" dirty="0">
+              <a:latin typeface="Franklin Gothic Medium" panose="020B0603020102020204" pitchFamily="34" charset="0"/>
+            </a:endParaRPr>
+          </a:p>
+          <a:p>
+            <a:endParaRPr lang="en-US" sz="3200" dirty="0">
               <a:latin typeface="Franklin Gothic Medium" panose="020B0603020102020204" pitchFamily="34" charset="0"/>
             </a:endParaRPr>
           </a:p>
@@ -4921,8 +4996,8 @@
         </p:nvSpPr>
         <p:spPr>
           <a:xfrm>
-            <a:off x="35661600" y="18364199"/>
-            <a:ext cx="14630400" cy="1200329"/>
+            <a:off x="34404300" y="24016514"/>
+            <a:ext cx="16002000" cy="1200329"/>
           </a:xfrm>
           <a:prstGeom prst="rect">
             <a:avLst/>
@@ -4943,13 +5018,7 @@
               <a:rPr lang="en-US" dirty="0">
                 <a:latin typeface="Franklin Gothic Medium" panose="020B0603020102020204" pitchFamily="34" charset="0"/>
               </a:rPr>
-              <a:t>EPL </a:t>
-            </a:r>
-            <a:r>
-              <a:rPr lang="en-US">
-                <a:latin typeface="Franklin Gothic Medium" panose="020B0603020102020204" pitchFamily="34" charset="0"/>
-              </a:rPr>
-              <a:t>calibrations improve</a:t>
+              <a:t>FPL/EPL calibrations reduce </a:t>
             </a:r>
           </a:p>
           <a:p>
@@ -4958,14 +5027,11 @@
               <a:buChar char="•"/>
             </a:pPr>
             <a:r>
-              <a:rPr lang="en-US">
+              <a:rPr lang="en-US" dirty="0">
                 <a:latin typeface="Franklin Gothic Medium" panose="020B0603020102020204" pitchFamily="34" charset="0"/>
               </a:rPr>
               <a:t> </a:t>
             </a:r>
-            <a:endParaRPr lang="en-US" dirty="0">
-              <a:latin typeface="Franklin Gothic Medium" panose="020B0603020102020204" pitchFamily="34" charset="0"/>
-            </a:endParaRPr>
           </a:p>
         </p:txBody>
       </p:sp>
@@ -4983,8 +5049,8 @@
         </p:nvSpPr>
         <p:spPr>
           <a:xfrm>
-            <a:off x="686728" y="13221831"/>
-            <a:ext cx="14630400" cy="2246769"/>
+            <a:off x="686728" y="12688431"/>
+            <a:ext cx="16002000" cy="2246769"/>
           </a:xfrm>
           <a:prstGeom prst="rect">
             <a:avLst/>
@@ -5031,8 +5097,8 @@
         </p:nvSpPr>
         <p:spPr bwMode="auto">
           <a:xfrm>
-            <a:off x="16459200" y="26136600"/>
-            <a:ext cx="18288000" cy="1005840"/>
+            <a:off x="17373600" y="20717649"/>
+            <a:ext cx="16459200" cy="1005840"/>
           </a:xfrm>
           <a:prstGeom prst="rect">
             <a:avLst/>
@@ -5064,78 +5130,6 @@
       </p:sp>
       <p:sp>
         <p:nvSpPr>
-          <p:cNvPr id="34" name="TextBox 33"/>
-          <p:cNvSpPr txBox="1"/>
-          <p:nvPr/>
-        </p:nvSpPr>
-        <p:spPr>
-          <a:xfrm>
-            <a:off x="16916400" y="17526000"/>
-            <a:ext cx="17373600" cy="2215991"/>
-          </a:xfrm>
-          <a:prstGeom prst="rect">
-            <a:avLst/>
-          </a:prstGeom>
-          <a:noFill/>
-        </p:spPr>
-        <p:txBody>
-          <a:bodyPr wrap="square" rtlCol="0">
-            <a:spAutoFit/>
-          </a:bodyPr>
-          <a:lstStyle/>
-          <a:p>
-            <a:r>
-              <a:rPr lang="en-US" sz="3200" b="1" u="sng" dirty="0">
-                <a:latin typeface="Franklin Gothic Medium" panose="020B0603020102020204" pitchFamily="34" charset="0"/>
-                <a:cs typeface="Arial"/>
-              </a:rPr>
-              <a:t>Individual Swept Distortion Product Otoacoustic Emissions after Calibration</a:t>
-            </a:r>
-          </a:p>
-          <a:p>
-            <a:pPr marL="457200" indent="-457200">
-              <a:buFont typeface="Arial" panose="020B0604020202020204" pitchFamily="34" charset="0"/>
-              <a:buChar char="•"/>
-            </a:pPr>
-            <a:r>
-              <a:rPr lang="en-US" sz="3200" dirty="0">
-                <a:latin typeface="Franklin Gothic Medium" panose="020B0603020102020204" pitchFamily="34" charset="0"/>
-                <a:cs typeface="Arial"/>
-              </a:rPr>
-              <a:t>Swept DPOAEs were measured from XXX-16 kHz. </a:t>
-            </a:r>
-          </a:p>
-          <a:p>
-            <a:pPr marL="457200" indent="-457200">
-              <a:buFont typeface="Arial" panose="020B0604020202020204" pitchFamily="34" charset="0"/>
-              <a:buChar char="•"/>
-            </a:pPr>
-            <a:r>
-              <a:rPr lang="en-US" sz="3200" dirty="0">
-                <a:latin typeface="Franklin Gothic Medium" panose="020B0603020102020204" pitchFamily="34" charset="0"/>
-                <a:cs typeface="Arial"/>
-              </a:rPr>
-              <a:t>Responses were windowed to isolate the distortion component, rather than calculate the mixed (D and R) components of the response. </a:t>
-            </a:r>
-            <a:r>
-              <a:rPr lang="en-US" sz="3200" u="sng" dirty="0">
-                <a:latin typeface="Franklin Gothic Medium" panose="020B0603020102020204" pitchFamily="34" charset="0"/>
-                <a:cs typeface="Arial"/>
-              </a:rPr>
-              <a:t> </a:t>
-            </a:r>
-          </a:p>
-          <a:p>
-            <a:pPr marL="457200" indent="-457200">
-              <a:buFont typeface="Arial"/>
-              <a:buChar char="•"/>
-            </a:pPr>
-            <a:endParaRPr lang="en-US" sz="1000" b="1" u="sng" dirty="0"/>
-          </a:p>
-        </p:txBody>
-      </p:sp>
-      <p:sp>
-        <p:nvSpPr>
           <p:cNvPr id="59" name="Rectangle 7">
             <a:extLst>
               <a:ext uri="{FF2B5EF4-FFF2-40B4-BE49-F238E27FC236}">
@@ -5150,8 +5144,8 @@
         </p:nvSpPr>
         <p:spPr bwMode="auto">
           <a:xfrm>
-            <a:off x="35204400" y="5029200"/>
-            <a:ext cx="15544800" cy="1005840"/>
+            <a:off x="34290000" y="5029200"/>
+            <a:ext cx="16459200" cy="1005840"/>
           </a:xfrm>
           <a:prstGeom prst="rect">
             <a:avLst/>
@@ -5176,20 +5170,87 @@
               <a:rPr lang="en-US" sz="6800" dirty="0">
                 <a:latin typeface="Franklin Gothic Medium Cond" panose="020B0606030402020204" pitchFamily="34" charset="0"/>
               </a:rPr>
-              <a:t>Effect of Age</a:t>
-            </a:r>
-          </a:p>
-        </p:txBody>
-      </p:sp>
-      <p:sp>
-        <p:nvSpPr>
-          <p:cNvPr id="13" name="Rectangle 35">
+              <a:t>Effect of Age and Noise Exposure</a:t>
+            </a:r>
+          </a:p>
+        </p:txBody>
+      </p:sp>
+      <p:sp>
+        <p:nvSpPr>
+          <p:cNvPr id="16" name="TextBox 15">
             <a:extLst>
               <a:ext uri="{FF2B5EF4-FFF2-40B4-BE49-F238E27FC236}">
-                <a16:creationId xmlns:a16="http://schemas.microsoft.com/office/drawing/2014/main" id="{060BD8F8-127E-00C3-9535-35B6B2095402}"/>
+                <a16:creationId xmlns:a16="http://schemas.microsoft.com/office/drawing/2014/main" id="{5C23D45A-DB8C-8DE8-B6C6-D07404F90F00}"/>
               </a:ext>
             </a:extLst>
           </p:cNvPr>
+          <p:cNvSpPr txBox="1"/>
+          <p:nvPr/>
+        </p:nvSpPr>
+        <p:spPr>
+          <a:xfrm>
+            <a:off x="845464" y="16125885"/>
+            <a:ext cx="9033103" cy="4524315"/>
+          </a:xfrm>
+          <a:prstGeom prst="rect">
+            <a:avLst/>
+          </a:prstGeom>
+          <a:noFill/>
+        </p:spPr>
+        <p:txBody>
+          <a:bodyPr wrap="square" rtlCol="0">
+            <a:spAutoFit/>
+          </a:bodyPr>
+          <a:lstStyle/>
+          <a:p>
+            <a:r>
+              <a:rPr lang="en-US" sz="3200" b="1" u="sng" dirty="0">
+                <a:latin typeface="Franklin Gothic Medium" panose="020B0603020102020204" pitchFamily="34" charset="0"/>
+              </a:rPr>
+              <a:t>The level at the OAE microphone underestimates the level at the eardrum due to standing waves in the ear canal. </a:t>
+            </a:r>
+          </a:p>
+          <a:p>
+            <a:pPr marL="457200" indent="-457200">
+              <a:buFont typeface="Arial" panose="020B0604020202020204" pitchFamily="34" charset="0"/>
+              <a:buChar char="•"/>
+            </a:pPr>
+            <a:r>
+              <a:rPr lang="en-US" sz="3200" dirty="0">
+                <a:latin typeface="Franklin Gothic Medium" panose="020B0603020102020204" pitchFamily="34" charset="0"/>
+              </a:rPr>
+              <a:t>Forward and backward traveling waves interact in the ear canal, preventing accurate measurement of sound levels in the ear. </a:t>
+            </a:r>
+          </a:p>
+          <a:p>
+            <a:pPr marL="457200" indent="-457200">
+              <a:buFont typeface="Arial" panose="020B0604020202020204" pitchFamily="34" charset="0"/>
+              <a:buChar char="•"/>
+            </a:pPr>
+            <a:r>
+              <a:rPr lang="en-US" sz="3200" dirty="0">
+                <a:latin typeface="Franklin Gothic Medium" panose="020B0603020102020204" pitchFamily="34" charset="0"/>
+              </a:rPr>
+              <a:t>This same problem occurs for the emission as it travels to the microphone. </a:t>
+            </a:r>
+          </a:p>
+          <a:p>
+            <a:pPr algn="ctr"/>
+            <a:endParaRPr lang="en-US" sz="3200" b="1" u="sng" dirty="0">
+              <a:latin typeface="Franklin Gothic Medium" panose="020B0603020102020204" pitchFamily="34" charset="0"/>
+            </a:endParaRPr>
+          </a:p>
+        </p:txBody>
+      </p:sp>
+      <p:sp>
+        <p:nvSpPr>
+          <p:cNvPr id="18" name="Rectangle 78">
+            <a:extLst>
+              <a:ext uri="{FF2B5EF4-FFF2-40B4-BE49-F238E27FC236}">
+                <a16:creationId xmlns:a16="http://schemas.microsoft.com/office/drawing/2014/main" id="{80E3E135-7B8A-1A8F-77C9-9DC7EB52A91D}"/>
+              </a:ext>
+            </a:extLst>
+          </p:cNvPr>
           <p:cNvSpPr>
             <a:spLocks noChangeArrowheads="1"/>
           </p:cNvSpPr>
@@ -5197,8 +5258,8 @@
         </p:nvSpPr>
         <p:spPr bwMode="auto">
           <a:xfrm>
-            <a:off x="685800" y="30937200"/>
-            <a:ext cx="15544800" cy="1005840"/>
+            <a:off x="34290000" y="32232600"/>
+            <a:ext cx="16459200" cy="1005840"/>
           </a:xfrm>
           <a:prstGeom prst="rect">
             <a:avLst/>
@@ -5223,117 +5284,6 @@
               <a:rPr lang="en-US" sz="6800" dirty="0">
                 <a:latin typeface="Franklin Gothic Medium Cond" panose="020B0606030402020204" pitchFamily="34" charset="0"/>
               </a:rPr>
-              <a:t>Methods</a:t>
-            </a:r>
-            <a:r>
-              <a:rPr lang="en-US" sz="6800" dirty="0">
-                <a:solidFill>
-                  <a:schemeClr val="bg1"/>
-                </a:solidFill>
-                <a:latin typeface="Franklin Gothic Medium Cond" panose="020B0606030402020204" pitchFamily="34" charset="0"/>
-              </a:rPr>
-              <a:t> </a:t>
-            </a:r>
-          </a:p>
-        </p:txBody>
-      </p:sp>
-      <p:sp>
-        <p:nvSpPr>
-          <p:cNvPr id="16" name="TextBox 15">
-            <a:extLst>
-              <a:ext uri="{FF2B5EF4-FFF2-40B4-BE49-F238E27FC236}">
-                <a16:creationId xmlns:a16="http://schemas.microsoft.com/office/drawing/2014/main" id="{5C23D45A-DB8C-8DE8-B6C6-D07404F90F00}"/>
-              </a:ext>
-            </a:extLst>
-          </p:cNvPr>
-          <p:cNvSpPr txBox="1"/>
-          <p:nvPr/>
-        </p:nvSpPr>
-        <p:spPr>
-          <a:xfrm>
-            <a:off x="457200" y="16632651"/>
-            <a:ext cx="15544800" cy="2062103"/>
-          </a:xfrm>
-          <a:prstGeom prst="rect">
-            <a:avLst/>
-          </a:prstGeom>
-          <a:noFill/>
-        </p:spPr>
-        <p:txBody>
-          <a:bodyPr wrap="square" rtlCol="0">
-            <a:spAutoFit/>
-          </a:bodyPr>
-          <a:lstStyle/>
-          <a:p>
-            <a:r>
-              <a:rPr lang="en-US" sz="3200" b="1" u="sng" dirty="0">
-                <a:latin typeface="Franklin Gothic Medium" panose="020B0603020102020204" pitchFamily="34" charset="0"/>
-              </a:rPr>
-              <a:t>FPL increases reliability of measures in the high frequencies</a:t>
-            </a:r>
-          </a:p>
-          <a:p>
-            <a:pPr marL="457200" indent="-457200">
-              <a:buFont typeface="Arial" panose="020B0604020202020204" pitchFamily="34" charset="0"/>
-              <a:buChar char="•"/>
-            </a:pPr>
-            <a:r>
-              <a:rPr lang="en-US" sz="3200" dirty="0">
-                <a:latin typeface="Franklin Gothic Medium" panose="020B0603020102020204" pitchFamily="34" charset="0"/>
-              </a:rPr>
-              <a:t>Calibrations vary significantly between individuals and across test sessions for a given subject up to 20 dB, especially in the high frequencies (&gt; 4 kHz).</a:t>
-            </a:r>
-          </a:p>
-          <a:p>
-            <a:pPr algn="ctr"/>
-            <a:endParaRPr lang="en-US" sz="3200" b="1" u="sng" dirty="0">
-              <a:latin typeface="Franklin Gothic Medium" panose="020B0603020102020204" pitchFamily="34" charset="0"/>
-            </a:endParaRPr>
-          </a:p>
-        </p:txBody>
-      </p:sp>
-      <p:sp>
-        <p:nvSpPr>
-          <p:cNvPr id="18" name="Rectangle 78">
-            <a:extLst>
-              <a:ext uri="{FF2B5EF4-FFF2-40B4-BE49-F238E27FC236}">
-                <a16:creationId xmlns:a16="http://schemas.microsoft.com/office/drawing/2014/main" id="{80E3E135-7B8A-1A8F-77C9-9DC7EB52A91D}"/>
-              </a:ext>
-            </a:extLst>
-          </p:cNvPr>
-          <p:cNvSpPr>
-            <a:spLocks noChangeArrowheads="1"/>
-          </p:cNvSpPr>
-          <p:nvPr/>
-        </p:nvSpPr>
-        <p:spPr bwMode="auto">
-          <a:xfrm>
-            <a:off x="35204400" y="32232600"/>
-            <a:ext cx="15544800" cy="1005840"/>
-          </a:xfrm>
-          <a:prstGeom prst="rect">
-            <a:avLst/>
-          </a:prstGeom>
-          <a:solidFill>
-            <a:srgbClr val="CFB991"/>
-          </a:solidFill>
-          <a:ln>
-            <a:noFill/>
-          </a:ln>
-        </p:spPr>
-        <p:txBody>
-          <a:bodyPr wrap="none" lIns="163275" tIns="81639" rIns="163275" bIns="81639" anchor="ctr"/>
-          <a:lstStyle>
-            <a:defPPr>
-              <a:defRPr kern="1200" smtId="4294967295"/>
-            </a:defPPr>
-          </a:lstStyle>
-          <a:p>
-            <a:pPr algn="ctr" defTabSz="5599100"/>
-            <a:r>
-              <a:rPr lang="en-US" sz="6800" dirty="0">
-                <a:latin typeface="Franklin Gothic Medium Cond" panose="020B0606030402020204" pitchFamily="34" charset="0"/>
-              </a:rPr>
               <a:t>References</a:t>
             </a:r>
           </a:p>
@@ -5353,8 +5303,8 @@
         </p:nvSpPr>
         <p:spPr>
           <a:xfrm>
-            <a:off x="35661600" y="36576000"/>
-            <a:ext cx="14630400" cy="1200329"/>
+            <a:off x="34518600" y="36518671"/>
+            <a:ext cx="16002000" cy="1200329"/>
           </a:xfrm>
           <a:prstGeom prst="rect">
             <a:avLst/>
@@ -5377,7 +5327,7 @@
             </a:r>
             <a:r>
               <a:rPr lang="en-US" dirty="0"/>
-              <a:t> and NIH T32XXXXX (SH)</a:t>
+              <a:t> and NIH T32- DC016853 (SH)</a:t>
             </a:r>
             <a:endParaRPr lang="en-US" sz="3600" dirty="0"/>
           </a:p>
@@ -5399,8 +5349,8 @@
         </p:nvSpPr>
         <p:spPr bwMode="auto">
           <a:xfrm>
-            <a:off x="16459200" y="5029200"/>
-            <a:ext cx="18288000" cy="1005840"/>
+            <a:off x="17373600" y="5029200"/>
+            <a:ext cx="16459200" cy="1005840"/>
           </a:xfrm>
           <a:prstGeom prst="rect">
             <a:avLst/>
@@ -5477,12 +5427,163 @@
           </a:extLst>
         </p:spPr>
       </p:pic>
+      <p:sp>
+        <p:nvSpPr>
+          <p:cNvPr id="65" name="TextBox 64">
+            <a:extLst>
+              <a:ext uri="{FF2B5EF4-FFF2-40B4-BE49-F238E27FC236}">
+                <a16:creationId xmlns:a16="http://schemas.microsoft.com/office/drawing/2014/main" id="{7C8327DB-8EA4-EF91-27C1-743215A5120E}"/>
+              </a:ext>
+            </a:extLst>
+          </p:cNvPr>
+          <p:cNvSpPr txBox="1"/>
+          <p:nvPr/>
+        </p:nvSpPr>
+        <p:spPr>
+          <a:xfrm>
+            <a:off x="34747200" y="6342683"/>
+            <a:ext cx="15087600" cy="1077218"/>
+          </a:xfrm>
+          <a:prstGeom prst="rect">
+            <a:avLst/>
+          </a:prstGeom>
+          <a:noFill/>
+        </p:spPr>
+        <p:txBody>
+          <a:bodyPr wrap="square" rtlCol="0">
+            <a:spAutoFit/>
+          </a:bodyPr>
+          <a:lstStyle/>
+          <a:p>
+            <a:r>
+              <a:rPr lang="en-US" sz="3200" spc="-1" dirty="0">
+                <a:solidFill>
+                  <a:srgbClr val="000000"/>
+                </a:solidFill>
+                <a:uFill>
+                  <a:solidFill>
+                    <a:srgbClr val="FFFFFF"/>
+                  </a:solidFill>
+                </a:uFill>
+                <a:latin typeface="Franklin Gothic Medium" panose="020B0603020102020204" pitchFamily="34" charset="0"/>
+                <a:cs typeface="Arial"/>
+              </a:rPr>
+              <a:t>Audiometric thresholds increase with age</a:t>
+            </a:r>
+          </a:p>
+          <a:p>
+            <a:r>
+              <a:rPr lang="en-US" sz="3200" spc="-1" dirty="0">
+                <a:solidFill>
+                  <a:srgbClr val="000000"/>
+                </a:solidFill>
+                <a:uFill>
+                  <a:solidFill>
+                    <a:srgbClr val="FFFFFF"/>
+                  </a:solidFill>
+                </a:uFill>
+                <a:latin typeface="Franklin Gothic Medium" panose="020B0603020102020204" pitchFamily="34" charset="0"/>
+                <a:cs typeface="Arial"/>
+              </a:rPr>
+              <a:t>There was no differences between men and women. </a:t>
+            </a:r>
+          </a:p>
+        </p:txBody>
+      </p:sp>
+      <p:sp>
+        <p:nvSpPr>
+          <p:cNvPr id="68" name="Rectangle 78">
+            <a:extLst>
+              <a:ext uri="{FF2B5EF4-FFF2-40B4-BE49-F238E27FC236}">
+                <a16:creationId xmlns:a16="http://schemas.microsoft.com/office/drawing/2014/main" id="{A89D35E9-3757-DF6A-6ECD-828A75FCEA0E}"/>
+              </a:ext>
+            </a:extLst>
+          </p:cNvPr>
+          <p:cNvSpPr>
+            <a:spLocks noChangeArrowheads="1"/>
+          </p:cNvSpPr>
+          <p:nvPr/>
+        </p:nvSpPr>
+        <p:spPr bwMode="auto">
+          <a:xfrm>
+            <a:off x="34290000" y="25664160"/>
+            <a:ext cx="16459200" cy="1005840"/>
+          </a:xfrm>
+          <a:prstGeom prst="rect">
+            <a:avLst/>
+          </a:prstGeom>
+          <a:solidFill>
+            <a:srgbClr val="CFB991"/>
+          </a:solidFill>
+          <a:ln>
+            <a:noFill/>
+          </a:ln>
+        </p:spPr>
+        <p:txBody>
+          <a:bodyPr wrap="none" lIns="163275" tIns="81639" rIns="163275" bIns="81639" anchor="ctr"/>
+          <a:lstStyle>
+            <a:defPPr>
+              <a:defRPr kern="1200" smtId="4294967295"/>
+            </a:defPPr>
+          </a:lstStyle>
+          <a:p>
+            <a:pPr algn="ctr" defTabSz="5599100"/>
+            <a:r>
+              <a:rPr lang="en-US" sz="6800" dirty="0">
+                <a:latin typeface="Franklin Gothic Medium Cond" panose="020B0606030402020204" pitchFamily="34" charset="0"/>
+              </a:rPr>
+              <a:t>Future Directions</a:t>
+            </a:r>
+          </a:p>
+        </p:txBody>
+      </p:sp>
+      <p:sp>
+        <p:nvSpPr>
+          <p:cNvPr id="75" name="TextBox 74">
+            <a:extLst>
+              <a:ext uri="{FF2B5EF4-FFF2-40B4-BE49-F238E27FC236}">
+                <a16:creationId xmlns:a16="http://schemas.microsoft.com/office/drawing/2014/main" id="{2F536783-DDDE-63B7-A12E-F2453CE634B4}"/>
+              </a:ext>
+            </a:extLst>
+          </p:cNvPr>
+          <p:cNvSpPr txBox="1"/>
+          <p:nvPr/>
+        </p:nvSpPr>
+        <p:spPr>
+          <a:xfrm>
+            <a:off x="34518600" y="26820674"/>
+            <a:ext cx="16002000" cy="1754326"/>
+          </a:xfrm>
+          <a:prstGeom prst="rect">
+            <a:avLst/>
+          </a:prstGeom>
+          <a:noFill/>
+        </p:spPr>
+        <p:txBody>
+          <a:bodyPr wrap="square">
+            <a:spAutoFit/>
+          </a:bodyPr>
+          <a:lstStyle/>
+          <a:p>
+            <a:pPr marL="457200" indent="-457200">
+              <a:buFont typeface="Arial" charset="0"/>
+              <a:buChar char="•"/>
+            </a:pPr>
+            <a:r>
+              <a:rPr lang="en-US" dirty="0">
+                <a:latin typeface="Franklin Gothic Medium" panose="020B0603020102020204" pitchFamily="34" charset="0"/>
+              </a:rPr>
+              <a:t>We are measuring both distortion and reflection type emissions using swept DPOAE and swept SFOAE paradigms and expanding to include individuals with sensorineural hearing loss. </a:t>
+            </a:r>
+          </a:p>
+        </p:txBody>
+      </p:sp>
       <p:pic>
         <p:nvPicPr>
-          <p:cNvPr id="60" name="Picture 59" descr="Chart, scatter chart&#10;&#10;Description automatically generated">
+          <p:cNvPr id="7" name="Picture 6" descr="Chart, histogram&#10;&#10;Description automatically generated">
             <a:extLst>
               <a:ext uri="{FF2B5EF4-FFF2-40B4-BE49-F238E27FC236}">
-                <a16:creationId xmlns:a16="http://schemas.microsoft.com/office/drawing/2014/main" id="{012662E4-0AC8-41AF-88DC-BD0B1542C925}"/>
+                <a16:creationId xmlns:a16="http://schemas.microsoft.com/office/drawing/2014/main" id="{99E8F989-6AB1-1714-44F6-E39CEF8271A6}"/>
               </a:ext>
             </a:extLst>
           </p:cNvPr>
@@ -5505,8 +5606,8 @@
         </p:blipFill>
         <p:spPr>
           <a:xfrm>
-            <a:off x="16916400" y="27508200"/>
-            <a:ext cx="7772400" cy="7315200"/>
+            <a:off x="1028236" y="28266529"/>
+            <a:ext cx="7772400" cy="5440680"/>
           </a:xfrm>
           <a:prstGeom prst="rect">
             <a:avLst/>
@@ -5515,10 +5616,10 @@
       </p:pic>
       <p:pic>
         <p:nvPicPr>
-          <p:cNvPr id="62" name="Picture 61" descr="Chart, scatter chart&#10;&#10;Description automatically generated">
+          <p:cNvPr id="10" name="Picture 9" descr="Chart, histogram&#10;&#10;Description automatically generated">
             <a:extLst>
               <a:ext uri="{FF2B5EF4-FFF2-40B4-BE49-F238E27FC236}">
-                <a16:creationId xmlns:a16="http://schemas.microsoft.com/office/drawing/2014/main" id="{935C4E61-16A3-6713-9C62-E0256D0ADFA6}"/>
+                <a16:creationId xmlns:a16="http://schemas.microsoft.com/office/drawing/2014/main" id="{85EF3506-EDB3-CAC1-9FA9-9C78811F8251}"/>
               </a:ext>
             </a:extLst>
           </p:cNvPr>
@@ -5541,8 +5642,8 @@
         </p:blipFill>
         <p:spPr>
           <a:xfrm>
-            <a:off x="42976800" y="9144000"/>
-            <a:ext cx="7772400" cy="7315200"/>
+            <a:off x="9085189" y="27999163"/>
+            <a:ext cx="7772400" cy="5440680"/>
           </a:xfrm>
           <a:prstGeom prst="rect">
             <a:avLst/>
@@ -5551,10 +5652,10 @@
       </p:pic>
       <p:pic>
         <p:nvPicPr>
-          <p:cNvPr id="64" name="Picture 63" descr="Chart, scatter chart&#10;&#10;Description automatically generated">
+          <p:cNvPr id="5" name="Picture 4" descr="Chart, histogram&#10;&#10;Description automatically generated">
             <a:extLst>
               <a:ext uri="{FF2B5EF4-FFF2-40B4-BE49-F238E27FC236}">
-                <a16:creationId xmlns:a16="http://schemas.microsoft.com/office/drawing/2014/main" id="{62B35F26-F54D-E4BB-C16A-35EB6BEAD72A}"/>
+                <a16:creationId xmlns:a16="http://schemas.microsoft.com/office/drawing/2014/main" id="{B9A18183-36FB-C59C-E77B-3C62AB341A94}"/>
               </a:ext>
             </a:extLst>
           </p:cNvPr>
@@ -5577,8 +5678,8 @@
         </p:blipFill>
         <p:spPr>
           <a:xfrm>
-            <a:off x="35204400" y="9144000"/>
-            <a:ext cx="7772400" cy="7315200"/>
+            <a:off x="7897368" y="20736957"/>
+            <a:ext cx="9144000" cy="6400800"/>
           </a:xfrm>
           <a:prstGeom prst="rect">
             <a:avLst/>
@@ -5587,10 +5688,10 @@
       </p:pic>
       <p:sp>
         <p:nvSpPr>
-          <p:cNvPr id="65" name="TextBox 64">
+          <p:cNvPr id="9" name="TextBox 8">
             <a:extLst>
               <a:ext uri="{FF2B5EF4-FFF2-40B4-BE49-F238E27FC236}">
-                <a16:creationId xmlns:a16="http://schemas.microsoft.com/office/drawing/2014/main" id="{7C8327DB-8EA4-EF91-27C1-743215A5120E}"/>
+                <a16:creationId xmlns:a16="http://schemas.microsoft.com/office/drawing/2014/main" id="{9C4352EB-9CFE-2604-AFA0-0E2DBC853FB7}"/>
               </a:ext>
             </a:extLst>
           </p:cNvPr>
@@ -5599,8 +5700,8 @@
         </p:nvSpPr>
         <p:spPr>
           <a:xfrm>
-            <a:off x="35204400" y="6858000"/>
-            <a:ext cx="15087600" cy="585216"/>
+            <a:off x="685800" y="33832800"/>
+            <a:ext cx="16002000" cy="3539430"/>
           </a:xfrm>
           <a:prstGeom prst="rect">
             <a:avLst/>
@@ -5608,43 +5709,144 @@
           <a:noFill/>
         </p:spPr>
         <p:txBody>
-          <a:bodyPr wrap="square" rtlCol="0">
+          <a:bodyPr wrap="square">
             <a:spAutoFit/>
           </a:bodyPr>
           <a:lstStyle/>
           <a:p>
-            <a:pPr marL="457200" indent="-457200">
-              <a:buFont typeface="Arial" charset="0"/>
-              <a:buChar char="•"/>
+            <a:r>
+              <a:rPr lang="en-US" sz="3200" b="1" u="sng" dirty="0">
+                <a:latin typeface="Franklin Gothic Medium" panose="020B0603020102020204" pitchFamily="34" charset="0"/>
+              </a:rPr>
+              <a:t>Calibration Methods</a:t>
+            </a:r>
+          </a:p>
+          <a:p>
+            <a:pPr marL="514350" indent="-514350">
+              <a:buAutoNum type="arabicPeriod"/>
             </a:pPr>
             <a:r>
               <a:rPr lang="en-US" sz="3200" dirty="0">
                 <a:latin typeface="Franklin Gothic Medium" panose="020B0603020102020204" pitchFamily="34" charset="0"/>
-                <a:cs typeface="Arial"/>
-              </a:rPr>
-              <a:t>Description of Age results</a:t>
-            </a:r>
-            <a:endParaRPr lang="en-US" sz="3200" spc="-1" dirty="0">
-              <a:solidFill>
-                <a:srgbClr val="000000"/>
-              </a:solidFill>
-              <a:uFill>
-                <a:solidFill>
-                  <a:srgbClr val="FFFFFF"/>
-                </a:solidFill>
-              </a:uFill>
-              <a:latin typeface="Franklin Gothic Medium" panose="020B0603020102020204" pitchFamily="34" charset="0"/>
-              <a:cs typeface="Arial"/>
-            </a:endParaRPr>
+              </a:rPr>
+              <a:t>Estimate Thevenin characteristics of probe using standard rigid tubes (ER-10X calibrator). </a:t>
+            </a:r>
+          </a:p>
+          <a:p>
+            <a:pPr marL="514350" indent="-514350">
+              <a:buAutoNum type="arabicPeriod"/>
+            </a:pPr>
+            <a:r>
+              <a:rPr lang="en-US" sz="3200" dirty="0">
+                <a:latin typeface="Franklin Gothic Medium" panose="020B0603020102020204" pitchFamily="34" charset="0"/>
+              </a:rPr>
+              <a:t>Estimate impedance, Z</a:t>
+            </a:r>
+            <a:r>
+              <a:rPr lang="en-US" sz="3200" baseline="-25000" dirty="0">
+                <a:latin typeface="Franklin Gothic Medium" panose="020B0603020102020204" pitchFamily="34" charset="0"/>
+              </a:rPr>
+              <a:t>L</a:t>
+            </a:r>
+            <a:r>
+              <a:rPr lang="en-US" sz="3200" dirty="0">
+                <a:latin typeface="Franklin Gothic Medium" panose="020B0603020102020204" pitchFamily="34" charset="0"/>
+              </a:rPr>
+              <a:t>, of the ear at the entrance to the canal</a:t>
+            </a:r>
+          </a:p>
+          <a:p>
+            <a:pPr marL="514350" indent="-514350">
+              <a:buFontTx/>
+              <a:buAutoNum type="arabicPeriod"/>
+            </a:pPr>
+            <a:r>
+              <a:rPr lang="en-US" sz="3200" dirty="0">
+                <a:latin typeface="Franklin Gothic Medium" panose="020B0603020102020204" pitchFamily="34" charset="0"/>
+              </a:rPr>
+              <a:t>Iteratively estimate characteristic impedance Z</a:t>
+            </a:r>
+            <a:r>
+              <a:rPr lang="en-US" sz="3200" baseline="-25000" dirty="0">
+                <a:latin typeface="Franklin Gothic Medium" panose="020B0603020102020204" pitchFamily="34" charset="0"/>
+              </a:rPr>
+              <a:t>0</a:t>
+            </a:r>
+            <a:r>
+              <a:rPr lang="en-US" sz="3200" dirty="0">
+                <a:latin typeface="Franklin Gothic Medium" panose="020B0603020102020204" pitchFamily="34" charset="0"/>
+              </a:rPr>
+              <a:t> of the ear canal by constraining time-domain reflectance to be causal (</a:t>
+            </a:r>
+            <a:r>
+              <a:rPr lang="en-US" sz="3200" dirty="0" err="1">
+                <a:latin typeface="Franklin Gothic Medium" panose="020B0603020102020204" pitchFamily="34" charset="0"/>
+              </a:rPr>
+              <a:t>Rasetshwane</a:t>
+            </a:r>
+            <a:r>
+              <a:rPr lang="en-US" sz="3200" dirty="0">
+                <a:latin typeface="Franklin Gothic Medium" panose="020B0603020102020204" pitchFamily="34" charset="0"/>
+              </a:rPr>
+              <a:t> &amp; Neely, 2011)</a:t>
+            </a:r>
+          </a:p>
+          <a:p>
+            <a:pPr marL="514350" indent="-514350">
+              <a:buFontTx/>
+              <a:buAutoNum type="arabicPeriod"/>
+            </a:pPr>
+            <a:r>
+              <a:rPr lang="en-US" sz="3200" dirty="0">
+                <a:latin typeface="Franklin Gothic Medium" panose="020B0603020102020204" pitchFamily="34" charset="0"/>
+              </a:rPr>
+              <a:t>Use Z</a:t>
+            </a:r>
+            <a:r>
+              <a:rPr lang="en-US" sz="3200" baseline="-25000" dirty="0">
+                <a:latin typeface="Franklin Gothic Medium" panose="020B0603020102020204" pitchFamily="34" charset="0"/>
+              </a:rPr>
+              <a:t>0 </a:t>
+            </a:r>
+            <a:r>
+              <a:rPr lang="en-US" sz="3200" dirty="0">
+                <a:latin typeface="Franklin Gothic Medium" panose="020B0603020102020204" pitchFamily="34" charset="0"/>
+              </a:rPr>
+              <a:t>and</a:t>
+            </a:r>
+            <a:r>
+              <a:rPr lang="en-US" sz="3200" baseline="-25000" dirty="0">
+                <a:latin typeface="Franklin Gothic Medium" panose="020B0603020102020204" pitchFamily="34" charset="0"/>
+              </a:rPr>
+              <a:t> </a:t>
+            </a:r>
+            <a:r>
+              <a:rPr lang="en-US" sz="3200" dirty="0">
+                <a:latin typeface="Franklin Gothic Medium" panose="020B0603020102020204" pitchFamily="34" charset="0"/>
+              </a:rPr>
+              <a:t>Z</a:t>
+            </a:r>
+            <a:r>
+              <a:rPr lang="en-US" sz="3200" baseline="-25000" dirty="0">
+                <a:latin typeface="Franklin Gothic Medium" panose="020B0603020102020204" pitchFamily="34" charset="0"/>
+              </a:rPr>
+              <a:t>L </a:t>
+            </a:r>
+            <a:r>
+              <a:rPr lang="en-US" sz="3200" dirty="0">
+                <a:latin typeface="Franklin Gothic Medium" panose="020B0603020102020204" pitchFamily="34" charset="0"/>
+              </a:rPr>
+              <a:t>to derive and control Forward Pressure Level (FPL). </a:t>
+            </a:r>
           </a:p>
         </p:txBody>
       </p:sp>
       <p:pic>
         <p:nvPicPr>
-          <p:cNvPr id="67" name="Picture 66" descr="Chart, scatter chart&#10;&#10;Description automatically generated">
+          <p:cNvPr id="44" name="Picture 43">
             <a:extLst>
               <a:ext uri="{FF2B5EF4-FFF2-40B4-BE49-F238E27FC236}">
-                <a16:creationId xmlns:a16="http://schemas.microsoft.com/office/drawing/2014/main" id="{5BF9C281-325A-EE57-A213-4978C95ADBE4}"/>
+                <a16:creationId xmlns:a16="http://schemas.microsoft.com/office/drawing/2014/main" id="{0FA6FAC1-E70F-ABE1-AD2D-C8A42B521AC6}"/>
               </a:ext>
             </a:extLst>
           </p:cNvPr>
@@ -5654,21 +5856,15 @@
           <p:nvPr/>
         </p:nvPicPr>
         <p:blipFill>
-          <a:blip r:embed="rId7">
-            <a:extLst>
-              <a:ext uri="{28A0092B-C50C-407E-A947-70E740481C1C}">
-                <a14:useLocalDpi xmlns:a14="http://schemas.microsoft.com/office/drawing/2010/main" val="0"/>
-              </a:ext>
-            </a:extLst>
-          </a:blip>
+          <a:blip r:embed="rId7"/>
           <a:stretch>
             <a:fillRect/>
           </a:stretch>
         </p:blipFill>
         <p:spPr>
           <a:xfrm>
-            <a:off x="25578816" y="27523440"/>
-            <a:ext cx="7772400" cy="7315200"/>
+            <a:off x="10210800" y="15745856"/>
+            <a:ext cx="5943600" cy="4637525"/>
           </a:xfrm>
           <a:prstGeom prst="rect">
             <a:avLst/>
@@ -5677,57 +5873,10 @@
       </p:pic>
       <p:sp>
         <p:nvSpPr>
-          <p:cNvPr id="68" name="Rectangle 78">
+          <p:cNvPr id="46" name="TextBox 45">
             <a:extLst>
               <a:ext uri="{FF2B5EF4-FFF2-40B4-BE49-F238E27FC236}">
-                <a16:creationId xmlns:a16="http://schemas.microsoft.com/office/drawing/2014/main" id="{A89D35E9-3757-DF6A-6ECD-828A75FCEA0E}"/>
-              </a:ext>
-            </a:extLst>
-          </p:cNvPr>
-          <p:cNvSpPr>
-            <a:spLocks noChangeArrowheads="1"/>
-          </p:cNvSpPr>
-          <p:nvPr/>
-        </p:nvSpPr>
-        <p:spPr bwMode="auto">
-          <a:xfrm>
-            <a:off x="35204400" y="26060400"/>
-            <a:ext cx="15544800" cy="1005840"/>
-          </a:xfrm>
-          <a:prstGeom prst="rect">
-            <a:avLst/>
-          </a:prstGeom>
-          <a:solidFill>
-            <a:srgbClr val="CFB991"/>
-          </a:solidFill>
-          <a:ln>
-            <a:noFill/>
-          </a:ln>
-        </p:spPr>
-        <p:txBody>
-          <a:bodyPr wrap="none" lIns="163275" tIns="81639" rIns="163275" bIns="81639" anchor="ctr"/>
-          <a:lstStyle>
-            <a:defPPr>
-              <a:defRPr kern="1200" smtId="4294967295"/>
-            </a:defPPr>
-          </a:lstStyle>
-          <a:p>
-            <a:pPr algn="ctr" defTabSz="5599100"/>
-            <a:r>
-              <a:rPr lang="en-US" sz="6800" dirty="0">
-                <a:latin typeface="Franklin Gothic Medium Cond" panose="020B0606030402020204" pitchFamily="34" charset="0"/>
-              </a:rPr>
-              <a:t>Future Directions</a:t>
-            </a:r>
-          </a:p>
-        </p:txBody>
-      </p:sp>
-      <p:sp>
-        <p:nvSpPr>
-          <p:cNvPr id="75" name="TextBox 74">
-            <a:extLst>
-              <a:ext uri="{FF2B5EF4-FFF2-40B4-BE49-F238E27FC236}">
-                <a16:creationId xmlns:a16="http://schemas.microsoft.com/office/drawing/2014/main" id="{2F536783-DDDE-63B7-A12E-F2453CE634B4}"/>
+                <a16:creationId xmlns:a16="http://schemas.microsoft.com/office/drawing/2014/main" id="{F48FACDE-2CEA-C814-721F-5BF14682794A}"/>
               </a:ext>
             </a:extLst>
           </p:cNvPr>
@@ -5736,8 +5885,8 @@
         </p:nvSpPr>
         <p:spPr>
           <a:xfrm>
-            <a:off x="35661600" y="27432000"/>
-            <a:ext cx="14630400" cy="1754326"/>
+            <a:off x="957072" y="21060787"/>
+            <a:ext cx="6917436" cy="7971413"/>
           </a:xfrm>
           <a:prstGeom prst="rect">
             <a:avLst/>
@@ -5750,25 +5899,233 @@
           </a:bodyPr>
           <a:lstStyle/>
           <a:p>
+            <a:r>
+              <a:rPr lang="en-US" sz="3200" b="1" u="sng" dirty="0">
+                <a:latin typeface="Franklin Gothic Medium" panose="020B0603020102020204" pitchFamily="34" charset="0"/>
+              </a:rPr>
+              <a:t>Traditional SPL calibrations lead to significant variability in output, especially at high frequencies</a:t>
+            </a:r>
+          </a:p>
+          <a:p>
+            <a:pPr marL="571500" indent="-571500">
+              <a:buFont typeface="Arial" panose="020B0604020202020204" pitchFamily="34" charset="0"/>
+              <a:buChar char="•"/>
+            </a:pPr>
+            <a:r>
+              <a:rPr lang="en-US" sz="3200" dirty="0">
+                <a:latin typeface="Franklin Gothic Medium" panose="020B0603020102020204" pitchFamily="34" charset="0"/>
+              </a:rPr>
+              <a:t>Greatest variability is seen at frequencies near and above 4 kHz. </a:t>
+            </a:r>
+          </a:p>
+          <a:p>
+            <a:endParaRPr lang="en-US" sz="3200" dirty="0">
+              <a:latin typeface="Franklin Gothic Medium" panose="020B0603020102020204" pitchFamily="34" charset="0"/>
+            </a:endParaRPr>
+          </a:p>
+          <a:p>
+            <a:r>
+              <a:rPr lang="en-US" sz="3200" b="1" u="sng" dirty="0">
+                <a:latin typeface="Franklin Gothic Medium" panose="020B0603020102020204" pitchFamily="34" charset="0"/>
+              </a:rPr>
+              <a:t>Ear canal acoustics differ significantly between ears and calibrations vary across test sessions. </a:t>
+            </a:r>
+          </a:p>
+          <a:p>
             <a:pPr marL="457200" indent="-457200">
-              <a:buFont typeface="Arial" charset="0"/>
+              <a:buFont typeface="Arial" panose="020B0604020202020204" pitchFamily="34" charset="0"/>
               <a:buChar char="•"/>
             </a:pPr>
+            <a:r>
+              <a:rPr lang="en-US" sz="3200" dirty="0">
+                <a:latin typeface="Franklin Gothic Medium" panose="020B0603020102020204" pitchFamily="34" charset="0"/>
+              </a:rPr>
+              <a:t>Three subjects vary by as much as 20 dB depending on the location of peaks. </a:t>
+            </a:r>
+          </a:p>
+          <a:p>
+            <a:pPr marL="457200" indent="-457200">
+              <a:buFont typeface="Arial" panose="020B0604020202020204" pitchFamily="34" charset="0"/>
+              <a:buChar char="•"/>
+            </a:pPr>
+            <a:r>
+              <a:rPr lang="en-US" sz="3200" dirty="0">
+                <a:latin typeface="Franklin Gothic Medium" panose="020B0603020102020204" pitchFamily="34" charset="0"/>
+              </a:rPr>
+              <a:t>Probe placement within the ear canal also affects calibrations. </a:t>
+            </a:r>
+          </a:p>
+          <a:p>
+            <a:pPr marL="457200" indent="-457200">
+              <a:buFont typeface="Arial" panose="020B0604020202020204" pitchFamily="34" charset="0"/>
+              <a:buChar char="•"/>
+            </a:pPr>
+            <a:endParaRPr lang="en-US" sz="3200" dirty="0">
+              <a:latin typeface="Franklin Gothic Medium" panose="020B0603020102020204" pitchFamily="34" charset="0"/>
+            </a:endParaRPr>
+          </a:p>
+          <a:p>
+            <a:pPr marL="571500" indent="-571500">
+              <a:buFont typeface="Arial" panose="020B0604020202020204" pitchFamily="34" charset="0"/>
+              <a:buChar char="•"/>
+            </a:pPr>
+            <a:endParaRPr lang="en-US" sz="3200" dirty="0">
+              <a:latin typeface="Franklin Gothic Medium" panose="020B0603020102020204" pitchFamily="34" charset="0"/>
+            </a:endParaRPr>
+          </a:p>
+        </p:txBody>
+      </p:sp>
+      <p:sp>
+        <p:nvSpPr>
+          <p:cNvPr id="49" name="TextBox 48">
+            <a:extLst>
+              <a:ext uri="{FF2B5EF4-FFF2-40B4-BE49-F238E27FC236}">
+                <a16:creationId xmlns:a16="http://schemas.microsoft.com/office/drawing/2014/main" id="{2809AFB2-C19D-AF9C-1FC3-C352E0B08B05}"/>
+              </a:ext>
+            </a:extLst>
+          </p:cNvPr>
+          <p:cNvSpPr txBox="1"/>
+          <p:nvPr/>
+        </p:nvSpPr>
+        <p:spPr>
+          <a:xfrm>
+            <a:off x="17041368" y="29800689"/>
+            <a:ext cx="16459200" cy="6186309"/>
+          </a:xfrm>
+          <a:prstGeom prst="rect">
+            <a:avLst/>
+          </a:prstGeom>
+          <a:noFill/>
+        </p:spPr>
+        <p:txBody>
+          <a:bodyPr wrap="square">
+            <a:spAutoFit/>
+          </a:bodyPr>
+          <a:lstStyle/>
+          <a:p>
+            <a:r>
+              <a:rPr lang="en-US" b="1" u="sng" dirty="0">
+                <a:latin typeface="Franklin Gothic Medium" panose="020B0603020102020204" pitchFamily="34" charset="0"/>
+                <a:cs typeface="Arial"/>
+              </a:rPr>
+              <a:t>High Frequencies (3-8 kHz) </a:t>
+            </a:r>
+          </a:p>
+          <a:p>
+            <a:pPr marL="571500" indent="-571500">
+              <a:buFont typeface="Arial" panose="020B0604020202020204" pitchFamily="34" charset="0"/>
+              <a:buChar char="•"/>
+            </a:pPr>
+            <a:r>
+              <a:rPr lang="en-US" sz="3600" dirty="0">
+                <a:latin typeface="Franklin Gothic Medium" panose="020B0603020102020204" pitchFamily="34" charset="0"/>
+                <a:cs typeface="Arial"/>
+              </a:rPr>
+              <a:t>All participants had normal hearing sensitivity through 8 kHz. DPOAEs wer</a:t>
+            </a:r>
             <a:r>
               <a:rPr lang="en-US" dirty="0">
                 <a:latin typeface="Franklin Gothic Medium" panose="020B0603020102020204" pitchFamily="34" charset="0"/>
-              </a:rPr>
-              <a:t>We are measuring both distortion and reflection type emissions using swept DPOAE and swept SFOAE paradigms and expanding to include individuals with sensorineural hearing loss. </a:t>
-            </a:r>
+                <a:cs typeface="Arial"/>
+              </a:rPr>
+              <a:t>e present for all participants in the same frequency range. </a:t>
+            </a:r>
+          </a:p>
+          <a:p>
+            <a:pPr marL="571500" indent="-571500">
+              <a:buFont typeface="Arial" panose="020B0604020202020204" pitchFamily="34" charset="0"/>
+              <a:buChar char="•"/>
+            </a:pPr>
+            <a:r>
+              <a:rPr lang="en-US" sz="3600" dirty="0">
+                <a:latin typeface="Franklin Gothic Medium" panose="020B0603020102020204" pitchFamily="34" charset="0"/>
+                <a:cs typeface="Arial"/>
+              </a:rPr>
+              <a:t>DPOAE amplitude was negatively correlated </a:t>
+            </a:r>
+            <a:r>
+              <a:rPr lang="en-US" dirty="0">
+                <a:latin typeface="Franklin Gothic Medium" panose="020B0603020102020204" pitchFamily="34" charset="0"/>
+                <a:cs typeface="Arial"/>
+              </a:rPr>
+              <a:t>with audiometric thresholds. </a:t>
+            </a:r>
+            <a:endParaRPr lang="en-US" sz="3600" dirty="0">
+              <a:latin typeface="Franklin Gothic Medium" panose="020B0603020102020204" pitchFamily="34" charset="0"/>
+              <a:cs typeface="Arial"/>
+            </a:endParaRPr>
+          </a:p>
+          <a:p>
+            <a:pPr marL="571500" indent="-571500">
+              <a:buFont typeface="Arial" panose="020B0604020202020204" pitchFamily="34" charset="0"/>
+              <a:buChar char="•"/>
+            </a:pPr>
+            <a:endParaRPr lang="en-US" dirty="0">
+              <a:latin typeface="Franklin Gothic Medium" panose="020B0603020102020204" pitchFamily="34" charset="0"/>
+              <a:cs typeface="Arial"/>
+            </a:endParaRPr>
+          </a:p>
+          <a:p>
+            <a:r>
+              <a:rPr lang="en-US" sz="3600" b="1" u="sng" dirty="0">
+                <a:latin typeface="Franklin Gothic Medium" panose="020B0603020102020204" pitchFamily="34" charset="0"/>
+                <a:cs typeface="Arial"/>
+              </a:rPr>
+              <a:t>Extended High Frequencies (9-16 kHz)</a:t>
+            </a:r>
+          </a:p>
+          <a:p>
+            <a:pPr marL="571500" indent="-571500">
+              <a:buFont typeface="Arial" panose="020B0604020202020204" pitchFamily="34" charset="0"/>
+              <a:buChar char="•"/>
+            </a:pPr>
+            <a:r>
+              <a:rPr lang="en-US" dirty="0">
+                <a:latin typeface="Franklin Gothic Medium" panose="020B0603020102020204" pitchFamily="34" charset="0"/>
+                <a:cs typeface="Arial"/>
+              </a:rPr>
+              <a:t>54.2% of participants who presented with normal hearing in the extended high frequency range had present DPOAEs. </a:t>
+            </a:r>
+            <a:r>
+              <a:rPr lang="en-US" sz="3600" dirty="0">
+                <a:latin typeface="Franklin Gothic Medium" panose="020B0603020102020204" pitchFamily="34" charset="0"/>
+                <a:cs typeface="Arial"/>
+              </a:rPr>
+              <a:t> </a:t>
+            </a:r>
+          </a:p>
+          <a:p>
+            <a:pPr marL="571500" indent="-571500">
+              <a:buFont typeface="Arial" panose="020B0604020202020204" pitchFamily="34" charset="0"/>
+              <a:buChar char="•"/>
+            </a:pPr>
+            <a:r>
+              <a:rPr lang="en-US" sz="3600" dirty="0">
+                <a:latin typeface="Franklin Gothic Medium" panose="020B0603020102020204" pitchFamily="34" charset="0"/>
+                <a:cs typeface="Arial"/>
+              </a:rPr>
+              <a:t>27.1% of </a:t>
+            </a:r>
+            <a:r>
+              <a:rPr lang="en-US" dirty="0">
+                <a:latin typeface="Franklin Gothic Medium" panose="020B0603020102020204" pitchFamily="34" charset="0"/>
+                <a:cs typeface="Arial"/>
+              </a:rPr>
+              <a:t>participants with thresholds &gt; 25 dB had DP amplitudes above the noise floor. 10.2% correct rejections. 8.4% had normal thresholds, but low DP amp.</a:t>
+            </a:r>
+            <a:endParaRPr lang="en-US" sz="3600" dirty="0">
+              <a:latin typeface="Franklin Gothic Medium" panose="020B0603020102020204" pitchFamily="34" charset="0"/>
+              <a:cs typeface="Arial"/>
+            </a:endParaRPr>
           </a:p>
         </p:txBody>
       </p:sp>
       <p:pic>
         <p:nvPicPr>
-          <p:cNvPr id="7" name="Picture 6" descr="Chart, histogram&#10;&#10;Description automatically generated">
+          <p:cNvPr id="51" name="Picture 50" descr="Chart, scatter chart&#10;&#10;Description automatically generated">
             <a:extLst>
               <a:ext uri="{FF2B5EF4-FFF2-40B4-BE49-F238E27FC236}">
-                <a16:creationId xmlns:a16="http://schemas.microsoft.com/office/drawing/2014/main" id="{99E8F989-6AB1-1714-44F6-E39CEF8271A6}"/>
+                <a16:creationId xmlns:a16="http://schemas.microsoft.com/office/drawing/2014/main" id="{A562C4DC-C083-386A-3F11-0105E299303B}"/>
               </a:ext>
             </a:extLst>
           </p:cNvPr>
@@ -5791,8 +6148,8 @@
         </p:blipFill>
         <p:spPr>
           <a:xfrm>
-            <a:off x="685800" y="18867120"/>
-            <a:ext cx="7772400" cy="5440680"/>
+            <a:off x="17830800" y="21999454"/>
+            <a:ext cx="7772400" cy="7315200"/>
           </a:xfrm>
           <a:prstGeom prst="rect">
             <a:avLst/>
@@ -5801,10 +6158,10 @@
       </p:pic>
       <p:pic>
         <p:nvPicPr>
-          <p:cNvPr id="10" name="Picture 9" descr="Chart, histogram&#10;&#10;Description automatically generated">
+          <p:cNvPr id="53" name="Picture 52" descr="Chart, scatter chart&#10;&#10;Description automatically generated">
             <a:extLst>
               <a:ext uri="{FF2B5EF4-FFF2-40B4-BE49-F238E27FC236}">
-                <a16:creationId xmlns:a16="http://schemas.microsoft.com/office/drawing/2014/main" id="{85EF3506-EDB3-CAC1-9FA9-9C78811F8251}"/>
+                <a16:creationId xmlns:a16="http://schemas.microsoft.com/office/drawing/2014/main" id="{61259219-1651-81BE-7FF8-1FFB8687D4FD}"/>
               </a:ext>
             </a:extLst>
           </p:cNvPr>
@@ -5827,112 +6184,178 @@
         </p:blipFill>
         <p:spPr>
           <a:xfrm>
-            <a:off x="8458200" y="18867120"/>
-            <a:ext cx="7772400" cy="5440680"/>
+            <a:off x="25603200" y="22074009"/>
+            <a:ext cx="7772400" cy="7315200"/>
           </a:xfrm>
           <a:prstGeom prst="rect">
             <a:avLst/>
           </a:prstGeom>
         </p:spPr>
       </p:pic>
-      <p:sp>
-        <p:nvSpPr>
-          <p:cNvPr id="17" name="TextBox 16">
+      <p:pic>
+        <p:nvPicPr>
+          <p:cNvPr id="66" name="Picture 65" descr="Chart, scatter chart&#10;&#10;Description automatically generated">
             <a:extLst>
               <a:ext uri="{FF2B5EF4-FFF2-40B4-BE49-F238E27FC236}">
-                <a16:creationId xmlns:a16="http://schemas.microsoft.com/office/drawing/2014/main" id="{04DBC4F7-69BB-DB86-77E7-C8957FB149E5}"/>
+                <a16:creationId xmlns:a16="http://schemas.microsoft.com/office/drawing/2014/main" id="{503850CE-727F-F12C-04AB-D5E2313DB265}"/>
               </a:ext>
             </a:extLst>
           </p:cNvPr>
-          <p:cNvSpPr txBox="1"/>
+          <p:cNvPicPr>
+            <a:picLocks noChangeAspect="1"/>
+          </p:cNvPicPr>
           <p:nvPr/>
-        </p:nvSpPr>
+        </p:nvPicPr>
+        <p:blipFill>
+          <a:blip r:embed="rId10">
+            <a:extLst>
+              <a:ext uri="{28A0092B-C50C-407E-A947-70E740481C1C}">
+                <a14:useLocalDpi xmlns:a14="http://schemas.microsoft.com/office/drawing/2010/main" val="0"/>
+              </a:ext>
+            </a:extLst>
+          </a:blip>
+          <a:stretch>
+            <a:fillRect/>
+          </a:stretch>
+        </p:blipFill>
         <p:spPr>
           <a:xfrm>
-            <a:off x="685800" y="24765000"/>
-            <a:ext cx="15087600" cy="5909310"/>
+            <a:off x="42633900" y="8153400"/>
+            <a:ext cx="7772400" cy="7315200"/>
           </a:xfrm>
           <a:prstGeom prst="rect">
             <a:avLst/>
           </a:prstGeom>
-          <a:noFill/>
         </p:spPr>
-        <p:txBody>
-          <a:bodyPr wrap="square">
-            <a:spAutoFit/>
-          </a:bodyPr>
-          <a:lstStyle/>
-          <a:p>
-            <a:r>
-              <a:rPr lang="en-US" u="sng" dirty="0">
-                <a:latin typeface="Franklin Gothic Medium" panose="020B0603020102020204" pitchFamily="34" charset="0"/>
-              </a:rPr>
-              <a:t>Probe Calibration</a:t>
-            </a:r>
-          </a:p>
-          <a:p>
-            <a:pPr marL="457200" indent="-457200">
-              <a:buFont typeface="Arial" charset="0"/>
-              <a:buChar char="•"/>
-            </a:pPr>
-            <a:r>
-              <a:rPr lang="en-US" dirty="0">
-                <a:latin typeface="Franklin Gothic Medium" panose="020B0603020102020204" pitchFamily="34" charset="0"/>
-              </a:rPr>
-              <a:t>The ER-10X probe was calibrated by coupling the </a:t>
-            </a:r>
-            <a:r>
-              <a:rPr lang="en-US" dirty="0" err="1">
-                <a:latin typeface="Franklin Gothic Medium" panose="020B0603020102020204" pitchFamily="34" charset="0"/>
-              </a:rPr>
-              <a:t>eartip</a:t>
-            </a:r>
-            <a:r>
-              <a:rPr lang="en-US" dirty="0">
-                <a:latin typeface="Franklin Gothic Medium" panose="020B0603020102020204" pitchFamily="34" charset="0"/>
-              </a:rPr>
-              <a:t> to the ER-10X calibrator (brass cylinders of 8 mm diameter and 5 different lengths) and measuring the response to a click probe to estimate the Thevenin-equivalent source pressure and impedance. </a:t>
-            </a:r>
-          </a:p>
-          <a:p>
-            <a:endParaRPr lang="en-US" sz="1800" dirty="0">
-              <a:latin typeface="Franklin Gothic Medium" panose="020B0603020102020204" pitchFamily="34" charset="0"/>
-            </a:endParaRPr>
-          </a:p>
-          <a:p>
-            <a:r>
-              <a:rPr lang="en-US" u="sng" dirty="0">
-                <a:latin typeface="Franklin Gothic Medium" panose="020B0603020102020204" pitchFamily="34" charset="0"/>
-              </a:rPr>
-              <a:t>In-ear Calibration</a:t>
-            </a:r>
-          </a:p>
-          <a:p>
-            <a:pPr marL="571500" indent="-571500">
-              <a:buFont typeface="Arial" panose="020B0604020202020204" pitchFamily="34" charset="0"/>
-              <a:buChar char="•"/>
-            </a:pPr>
-            <a:r>
-              <a:rPr lang="en-US" dirty="0">
-                <a:latin typeface="Franklin Gothic Medium" panose="020B0603020102020204" pitchFamily="34" charset="0"/>
-              </a:rPr>
-              <a:t>Once the </a:t>
-            </a:r>
-            <a:r>
-              <a:rPr lang="en-US" dirty="0" err="1">
-                <a:latin typeface="Franklin Gothic Medium" panose="020B0603020102020204" pitchFamily="34" charset="0"/>
-              </a:rPr>
-              <a:t>eartip</a:t>
-            </a:r>
-            <a:r>
-              <a:rPr lang="en-US" dirty="0">
-                <a:latin typeface="Franklin Gothic Medium" panose="020B0603020102020204" pitchFamily="34" charset="0"/>
-              </a:rPr>
-              <a:t> was placed in the subject’s ear, the click stimulus was used to estimate the immittance properties of the subject’s ear. Low-frequency (200-500 Hz average) ear absorbance was less than 29% to ensure an adequate seal was acquired. </a:t>
-            </a:r>
-          </a:p>
-        </p:txBody>
-      </p:sp>
+      </p:pic>
+      <p:pic>
+        <p:nvPicPr>
+          <p:cNvPr id="70" name="Picture 69" descr="Chart, scatter chart&#10;&#10;Description automatically generated">
+            <a:extLst>
+              <a:ext uri="{FF2B5EF4-FFF2-40B4-BE49-F238E27FC236}">
+                <a16:creationId xmlns:a16="http://schemas.microsoft.com/office/drawing/2014/main" id="{3D9F1DF4-7B9E-4B82-7DFA-5EF7A760E8F3}"/>
+              </a:ext>
+            </a:extLst>
+          </p:cNvPr>
+          <p:cNvPicPr>
+            <a:picLocks noChangeAspect="1"/>
+          </p:cNvPicPr>
+          <p:nvPr/>
+        </p:nvPicPr>
+        <p:blipFill>
+          <a:blip r:embed="rId11">
+            <a:extLst>
+              <a:ext uri="{28A0092B-C50C-407E-A947-70E740481C1C}">
+                <a14:useLocalDpi xmlns:a14="http://schemas.microsoft.com/office/drawing/2010/main" val="0"/>
+              </a:ext>
+            </a:extLst>
+          </a:blip>
+          <a:stretch>
+            <a:fillRect/>
+          </a:stretch>
+        </p:blipFill>
+        <p:spPr>
+          <a:xfrm>
+            <a:off x="34864964" y="8034999"/>
+            <a:ext cx="7772400" cy="7315200"/>
+          </a:xfrm>
+          <a:prstGeom prst="rect">
+            <a:avLst/>
+          </a:prstGeom>
+        </p:spPr>
+      </p:pic>
+      <p:grpSp>
+        <p:nvGrpSpPr>
+          <p:cNvPr id="73" name="Group 72">
+            <a:extLst>
+              <a:ext uri="{FF2B5EF4-FFF2-40B4-BE49-F238E27FC236}">
+                <a16:creationId xmlns:a16="http://schemas.microsoft.com/office/drawing/2014/main" id="{33960F23-5A1D-C7F1-3D20-187801539EEA}"/>
+              </a:ext>
+            </a:extLst>
+          </p:cNvPr>
+          <p:cNvGrpSpPr/>
+          <p:nvPr/>
+        </p:nvGrpSpPr>
+        <p:grpSpPr>
+          <a:xfrm>
+            <a:off x="34518600" y="15697200"/>
+            <a:ext cx="10972800" cy="5070316"/>
+            <a:chOff x="34518600" y="15697200"/>
+            <a:chExt cx="10972800" cy="5070316"/>
+          </a:xfrm>
+        </p:grpSpPr>
+        <p:pic>
+          <p:nvPicPr>
+            <p:cNvPr id="56" name="Picture 55" descr="Chart, scatter chart&#10;&#10;Description automatically generated">
+              <a:extLst>
+                <a:ext uri="{FF2B5EF4-FFF2-40B4-BE49-F238E27FC236}">
+                  <a16:creationId xmlns:a16="http://schemas.microsoft.com/office/drawing/2014/main" id="{3F60291D-F2B5-C71B-4381-FB2E3F70C492}"/>
+                </a:ext>
+              </a:extLst>
+            </p:cNvPr>
+            <p:cNvPicPr>
+              <a:picLocks noChangeAspect="1"/>
+            </p:cNvPicPr>
+            <p:nvPr/>
+          </p:nvPicPr>
+          <p:blipFill>
+            <a:blip r:embed="rId12">
+              <a:extLst>
+                <a:ext uri="{28A0092B-C50C-407E-A947-70E740481C1C}">
+                  <a14:useLocalDpi xmlns:a14="http://schemas.microsoft.com/office/drawing/2010/main" val="0"/>
+                </a:ext>
+              </a:extLst>
+            </a:blip>
+            <a:stretch>
+              <a:fillRect/>
+            </a:stretch>
+          </p:blipFill>
+          <p:spPr>
+            <a:xfrm>
+              <a:off x="34518600" y="15697200"/>
+              <a:ext cx="10972800" cy="4800600"/>
+            </a:xfrm>
+            <a:prstGeom prst="rect">
+              <a:avLst/>
+            </a:prstGeom>
+          </p:spPr>
+        </p:pic>
+        <p:pic>
+          <p:nvPicPr>
+            <p:cNvPr id="72" name="Picture 71" descr="Chart, scatter chart&#10;&#10;Description automatically generated">
+              <a:extLst>
+                <a:ext uri="{FF2B5EF4-FFF2-40B4-BE49-F238E27FC236}">
+                  <a16:creationId xmlns:a16="http://schemas.microsoft.com/office/drawing/2014/main" id="{8C302E66-490B-87D2-E552-C68E32A2CB42}"/>
+                </a:ext>
+              </a:extLst>
+            </p:cNvPr>
+            <p:cNvPicPr>
+              <a:picLocks noChangeAspect="1"/>
+            </p:cNvPicPr>
+            <p:nvPr/>
+          </p:nvPicPr>
+          <p:blipFill rotWithShape="1">
+            <a:blip r:embed="rId9">
+              <a:extLst>
+                <a:ext uri="{28A0092B-C50C-407E-A947-70E740481C1C}">
+                  <a14:useLocalDpi xmlns:a14="http://schemas.microsoft.com/office/drawing/2010/main" val="0"/>
+                </a:ext>
+              </a:extLst>
+            </a:blip>
+            <a:srcRect t="93816"/>
+            <a:stretch/>
+          </p:blipFill>
+          <p:spPr>
+            <a:xfrm>
+              <a:off x="36957000" y="20421600"/>
+              <a:ext cx="5943600" cy="345916"/>
+            </a:xfrm>
+            <a:prstGeom prst="rect">
+              <a:avLst/>
+            </a:prstGeom>
+          </p:spPr>
+        </p:pic>
+      </p:grpSp>
     </p:spTree>
   </p:cSld>
   <p:clrMapOvr>

</xml_diff>